<commit_message>
Updates with new results
</commit_message>
<xml_diff>
--- a/presentation/fdd-hk-presentation-bf.pptx
+++ b/presentation/fdd-hk-presentation-bf.pptx
@@ -5679,7 +5679,6 @@
               <a:rPr lang="fr-FR" dirty="0" smtClean="0"/>
               <a:t>Remplissage des vides par des 0</a:t>
             </a:r>
-            <a:endParaRPr lang="fr-FR" dirty="0" smtClean="0"/>
           </a:p>
         </p:txBody>
       </p:sp>
@@ -6127,7 +6126,6 @@
               <a:rPr lang="fr-FR" sz="1600" dirty="0" smtClean="0"/>
               <a:t>catégories</a:t>
             </a:r>
-            <a:endParaRPr lang="fr-FR" sz="1600" dirty="0" smtClean="0"/>
           </a:p>
         </p:txBody>
       </p:sp>
@@ -6862,7 +6860,6 @@
               <a:rPr lang="fr-FR" dirty="0" smtClean="0"/>
               <a:t> le nombre de catégories est resté le même i.e. 235</a:t>
             </a:r>
-            <a:endParaRPr lang="fr-FR" dirty="0" smtClean="0"/>
           </a:p>
         </p:txBody>
       </p:sp>
@@ -7047,49 +7044,21 @@
           <a:lstStyle/>
           <a:p>
             <a:r>
-              <a:rPr lang="en-US" dirty="0" err="1" smtClean="0"/>
-              <a:t>Séquenciel</a:t>
-            </a:r>
-            <a:r>
-              <a:rPr lang="en-US" dirty="0" smtClean="0"/>
-              <a:t> et par </a:t>
-            </a:r>
-            <a:r>
-              <a:rPr lang="en-US" dirty="0" err="1" smtClean="0"/>
-              <a:t>ordre</a:t>
-            </a:r>
-            <a:r>
-              <a:rPr lang="en-US" dirty="0" smtClean="0"/>
-              <a:t> </a:t>
-            </a:r>
-            <a:r>
-              <a:rPr lang="en-US" dirty="0" err="1" smtClean="0"/>
-              <a:t>d’apparition</a:t>
-            </a:r>
-            <a:r>
-              <a:rPr lang="en-US" dirty="0" smtClean="0"/>
-              <a:t> : 0, 1, 2, 3</a:t>
-            </a:r>
-            <a:r>
-              <a:rPr lang="mr-IN" dirty="0" smtClean="0"/>
-              <a:t>…</a:t>
-            </a:r>
-            <a:r>
-              <a:rPr lang="fr-FR" dirty="0" smtClean="0"/>
-              <a:t> N pour toutes les colonnes à l’exception du coût de la transaction</a:t>
+              <a:rPr lang="fr-FR" dirty="0" smtClean="0"/>
+              <a:t>Séquentiel et par ordre d’apparition : 0, 1, 2, 3… N pour toutes les colonnes à l’exception du coût de la transaction</a:t>
+            </a:r>
+          </a:p>
+          <a:p>
+            <a:endParaRPr lang="fr-FR" dirty="0" smtClean="0"/>
+          </a:p>
+          <a:p>
+            <a:r>
+              <a:rPr lang="fr-FR" dirty="0" smtClean="0"/>
+              <a:t>Le coût de la transaction a été encodé en utilisant un normalisation par Minimum (=0) et Maximum (=1)</a:t>
             </a:r>
           </a:p>
           <a:p>
             <a:endParaRPr lang="fr-FR" dirty="0"/>
-          </a:p>
-          <a:p>
-            <a:r>
-              <a:rPr lang="fr-FR" dirty="0" smtClean="0"/>
-              <a:t>Le coût de la transaction a été encodé en utilisant un normalisation par Minimum (=0) et Maximum (=1)</a:t>
-            </a:r>
-          </a:p>
-          <a:p>
-            <a:endParaRPr lang="en-US" dirty="0"/>
           </a:p>
         </p:txBody>
       </p:sp>
@@ -7152,25 +7121,6 @@
           <a:chExt cx="0" cy="0"/>
         </a:xfrm>
       </p:grpSpPr>
-      <p:sp>
-        <p:nvSpPr>
-          <p:cNvPr id="2" name="Title 1"/>
-          <p:cNvSpPr>
-            <a:spLocks noGrp="1"/>
-          </p:cNvSpPr>
-          <p:nvPr>
-            <p:ph type="title"/>
-          </p:nvPr>
-        </p:nvSpPr>
-        <p:spPr/>
-        <p:txBody>
-          <a:bodyPr/>
-          <a:lstStyle/>
-          <a:p>
-            <a:endParaRPr lang="en-US"/>
-          </a:p>
-        </p:txBody>
-      </p:sp>
       <p:pic>
         <p:nvPicPr>
           <p:cNvPr id="4" name="Content Placeholder 3"/>
@@ -7319,25 +7269,6 @@
           <a:chExt cx="0" cy="0"/>
         </a:xfrm>
       </p:grpSpPr>
-      <p:sp>
-        <p:nvSpPr>
-          <p:cNvPr id="2" name="Title 1"/>
-          <p:cNvSpPr>
-            <a:spLocks noGrp="1"/>
-          </p:cNvSpPr>
-          <p:nvPr>
-            <p:ph type="title"/>
-          </p:nvPr>
-        </p:nvSpPr>
-        <p:spPr/>
-        <p:txBody>
-          <a:bodyPr/>
-          <a:lstStyle/>
-          <a:p>
-            <a:endParaRPr lang="en-US"/>
-          </a:p>
-        </p:txBody>
-      </p:sp>
       <p:pic>
         <p:nvPicPr>
           <p:cNvPr id="4" name="Content Placeholder 3"/>
@@ -7500,7 +7431,6 @@
               <a:rPr lang="fr-FR" dirty="0" smtClean="0"/>
               <a:t> » a été utilisée parce qu’elle découpe en gardant une homogénéité dans les deux ensembles par rapport à l’ensemble source</a:t>
             </a:r>
-            <a:endParaRPr lang="fr-FR" dirty="0" smtClean="0"/>
           </a:p>
           <a:p>
             <a:endParaRPr lang="fr-FR" dirty="0" smtClean="0"/>
@@ -7589,36 +7519,20 @@
           <a:lstStyle/>
           <a:p>
             <a:r>
-              <a:rPr lang="en-US" dirty="0" err="1" smtClean="0"/>
-              <a:t>Précision</a:t>
-            </a:r>
-            <a:r>
-              <a:rPr lang="en-US" dirty="0" smtClean="0"/>
-              <a:t> </a:t>
-            </a:r>
-            <a:r>
-              <a:rPr lang="en-US" dirty="0" err="1" smtClean="0"/>
-              <a:t>moyenne</a:t>
-            </a:r>
-            <a:r>
-              <a:rPr lang="en-US" dirty="0" smtClean="0"/>
-              <a:t> : 0.2%</a:t>
-            </a:r>
-          </a:p>
-          <a:p>
-            <a:r>
-              <a:rPr lang="en-US" dirty="0" smtClean="0"/>
-              <a:t>Recall </a:t>
-            </a:r>
-            <a:r>
-              <a:rPr lang="en-US" dirty="0" err="1" smtClean="0"/>
-              <a:t>moyen</a:t>
-            </a:r>
-            <a:r>
-              <a:rPr lang="en-US" dirty="0" smtClean="0"/>
-              <a:t> : 0.6%</a:t>
-            </a:r>
-            <a:endParaRPr lang="en-US" dirty="0"/>
+              <a:rPr lang="fr-FR" dirty="0" smtClean="0"/>
+              <a:t>Précision moyenne : 0.2%</a:t>
+            </a:r>
+          </a:p>
+          <a:p>
+            <a:r>
+              <a:rPr lang="fr-FR" dirty="0" err="1" smtClean="0"/>
+              <a:t>Recall</a:t>
+            </a:r>
+            <a:r>
+              <a:rPr lang="fr-FR" dirty="0" smtClean="0"/>
+              <a:t> moyen : 0.6%</a:t>
+            </a:r>
+            <a:endParaRPr lang="fr-FR" dirty="0"/>
           </a:p>
         </p:txBody>
       </p:sp>
@@ -7701,36 +7615,20 @@
           <a:lstStyle/>
           <a:p>
             <a:r>
-              <a:rPr lang="en-US" smtClean="0"/>
-              <a:t>Précision</a:t>
-            </a:r>
-            <a:r>
-              <a:rPr lang="en-US" dirty="0" smtClean="0"/>
-              <a:t> </a:t>
-            </a:r>
-            <a:r>
-              <a:rPr lang="en-US" dirty="0" err="1" smtClean="0"/>
-              <a:t>moyenne</a:t>
-            </a:r>
-            <a:r>
-              <a:rPr lang="en-US" dirty="0" smtClean="0"/>
-              <a:t> : 0.2%</a:t>
-            </a:r>
-          </a:p>
-          <a:p>
-            <a:r>
-              <a:rPr lang="en-US" dirty="0" smtClean="0"/>
-              <a:t>Recall </a:t>
-            </a:r>
-            <a:r>
-              <a:rPr lang="en-US" dirty="0" err="1" smtClean="0"/>
-              <a:t>moyen</a:t>
-            </a:r>
-            <a:r>
-              <a:rPr lang="en-US" dirty="0" smtClean="0"/>
-              <a:t> : 0.6%</a:t>
-            </a:r>
-            <a:endParaRPr lang="en-US" dirty="0"/>
+              <a:rPr lang="fr-FR" dirty="0" smtClean="0"/>
+              <a:t>Précision moyenne : 0.2%</a:t>
+            </a:r>
+          </a:p>
+          <a:p>
+            <a:r>
+              <a:rPr lang="fr-FR" dirty="0" err="1" smtClean="0"/>
+              <a:t>Recall</a:t>
+            </a:r>
+            <a:r>
+              <a:rPr lang="fr-FR" dirty="0" smtClean="0"/>
+              <a:t> moyen : 0.6%</a:t>
+            </a:r>
+            <a:endParaRPr lang="fr-FR" dirty="0"/>
           </a:p>
         </p:txBody>
       </p:sp>
@@ -7859,50 +7757,46 @@
           <a:lstStyle/>
           <a:p>
             <a:r>
-              <a:rPr lang="en-US" dirty="0" smtClean="0"/>
-              <a:t>Accuracy : 97% (Is this </a:t>
-            </a:r>
-            <a:r>
-              <a:rPr lang="en-US" dirty="0" err="1" smtClean="0"/>
+              <a:rPr lang="fr-FR" dirty="0" err="1" smtClean="0"/>
+              <a:t>Accuracy</a:t>
+            </a:r>
+            <a:r>
+              <a:rPr lang="fr-FR" dirty="0" smtClean="0"/>
+              <a:t> : 97% (Is </a:t>
+            </a:r>
+            <a:r>
+              <a:rPr lang="fr-FR" dirty="0" err="1" smtClean="0"/>
+              <a:t>this</a:t>
+            </a:r>
+            <a:r>
+              <a:rPr lang="fr-FR" dirty="0" smtClean="0"/>
+              <a:t> </a:t>
+            </a:r>
+            <a:r>
+              <a:rPr lang="fr-FR" dirty="0" err="1" smtClean="0"/>
               <a:t>overfiting</a:t>
             </a:r>
             <a:r>
-              <a:rPr lang="en-US" dirty="0" smtClean="0"/>
+              <a:rPr lang="fr-FR" dirty="0" smtClean="0"/>
               <a:t> ?!!!)</a:t>
             </a:r>
           </a:p>
           <a:p>
             <a:r>
-              <a:rPr lang="en-US" dirty="0" err="1" smtClean="0"/>
-              <a:t>Précision</a:t>
-            </a:r>
-            <a:r>
-              <a:rPr lang="en-US" dirty="0" smtClean="0"/>
-              <a:t> </a:t>
-            </a:r>
-            <a:r>
-              <a:rPr lang="en-US" dirty="0" err="1" smtClean="0"/>
-              <a:t>moyenne</a:t>
-            </a:r>
-            <a:r>
-              <a:rPr lang="en-US" dirty="0" smtClean="0"/>
-              <a:t> : 93.7%</a:t>
-            </a:r>
-          </a:p>
-          <a:p>
-            <a:r>
-              <a:rPr lang="en-US" dirty="0" smtClean="0"/>
-              <a:t>Recall </a:t>
-            </a:r>
-            <a:r>
-              <a:rPr lang="en-US" dirty="0" err="1" smtClean="0"/>
-              <a:t>moyen</a:t>
-            </a:r>
-            <a:r>
-              <a:rPr lang="en-US" dirty="0" smtClean="0"/>
-              <a:t> : 93.5%</a:t>
-            </a:r>
-            <a:endParaRPr lang="en-US" dirty="0"/>
+              <a:rPr lang="fr-FR" dirty="0" smtClean="0"/>
+              <a:t>Précision moyenne : 93.7%</a:t>
+            </a:r>
+          </a:p>
+          <a:p>
+            <a:r>
+              <a:rPr lang="fr-FR" dirty="0" err="1" smtClean="0"/>
+              <a:t>Recall</a:t>
+            </a:r>
+            <a:r>
+              <a:rPr lang="fr-FR" dirty="0" smtClean="0"/>
+              <a:t> moyen : 93.5%</a:t>
+            </a:r>
+            <a:endParaRPr lang="fr-FR" dirty="0"/>
           </a:p>
         </p:txBody>
       </p:sp>
@@ -8034,68 +7928,36 @@
               <a:buNone/>
             </a:pPr>
             <a:r>
-              <a:rPr lang="en-US" b="1" dirty="0" err="1" smtClean="0"/>
-              <a:t>Profondeur</a:t>
-            </a:r>
-            <a:r>
-              <a:rPr lang="en-US" b="1" dirty="0" smtClean="0"/>
-              <a:t> </a:t>
-            </a:r>
-            <a:r>
-              <a:rPr lang="en-US" b="1" dirty="0" err="1" smtClean="0"/>
-              <a:t>plafonnée</a:t>
-            </a:r>
-            <a:r>
-              <a:rPr lang="en-US" b="1" dirty="0" smtClean="0"/>
-              <a:t> </a:t>
-            </a:r>
-            <a:r>
-              <a:rPr lang="en-US" b="1" dirty="0" err="1" smtClean="0"/>
-              <a:t>à</a:t>
-            </a:r>
-            <a:r>
-              <a:rPr lang="en-US" b="1" dirty="0" smtClean="0"/>
-              <a:t> 27</a:t>
-            </a:r>
-          </a:p>
-          <a:p>
-            <a:r>
-              <a:rPr lang="en-US" dirty="0" smtClean="0"/>
-              <a:t>Accuracy : 93%</a:t>
-            </a:r>
-          </a:p>
-          <a:p>
-            <a:r>
-              <a:rPr lang="en-US" dirty="0" err="1" smtClean="0"/>
-              <a:t>Précision</a:t>
-            </a:r>
-            <a:r>
-              <a:rPr lang="en-US" dirty="0" smtClean="0"/>
-              <a:t> </a:t>
-            </a:r>
-            <a:r>
-              <a:rPr lang="en-US" dirty="0" err="1" smtClean="0"/>
-              <a:t>moyenne</a:t>
-            </a:r>
-            <a:r>
-              <a:rPr lang="en-US" dirty="0" smtClean="0"/>
-              <a:t> : 92.3%</a:t>
-            </a:r>
-          </a:p>
-          <a:p>
-            <a:r>
-              <a:rPr lang="en-US" dirty="0" smtClean="0"/>
-              <a:t>Recall </a:t>
-            </a:r>
-            <a:r>
-              <a:rPr lang="en-US" dirty="0" err="1" smtClean="0"/>
-              <a:t>moyen</a:t>
-            </a:r>
-            <a:r>
-              <a:rPr lang="en-US" dirty="0" smtClean="0"/>
-              <a:t> : 87.5%</a:t>
-            </a:r>
-            <a:endParaRPr lang="en-US" dirty="0"/>
+              <a:rPr lang="fr-FR" b="1" dirty="0" smtClean="0"/>
+              <a:t>Profondeur plafonnée à 21</a:t>
+            </a:r>
+          </a:p>
+          <a:p>
+            <a:r>
+              <a:rPr lang="fr-FR" dirty="0" err="1" smtClean="0"/>
+              <a:t>Accuracy</a:t>
+            </a:r>
+            <a:r>
+              <a:rPr lang="fr-FR" dirty="0" smtClean="0"/>
+              <a:t> : 85%</a:t>
+            </a:r>
+          </a:p>
+          <a:p>
+            <a:r>
+              <a:rPr lang="fr-FR" dirty="0" smtClean="0"/>
+              <a:t>Précision moyenne : 87.1%</a:t>
+            </a:r>
+          </a:p>
+          <a:p>
+            <a:r>
+              <a:rPr lang="fr-FR" dirty="0" err="1" smtClean="0"/>
+              <a:t>Recall</a:t>
+            </a:r>
+            <a:r>
+              <a:rPr lang="fr-FR" dirty="0" smtClean="0"/>
+              <a:t> moyen : 73%</a:t>
+            </a:r>
+            <a:endParaRPr lang="fr-FR" dirty="0"/>
           </a:p>
         </p:txBody>
       </p:sp>
@@ -8157,18 +8019,10 @@
           <a:lstStyle/>
           <a:p>
             <a:r>
-              <a:rPr lang="en-US" dirty="0" smtClean="0"/>
-              <a:t>Classification (For</a:t>
-            </a:r>
-            <a:r>
-              <a:rPr lang="fr-FR" dirty="0" err="1" smtClean="0"/>
-              <a:t>êt</a:t>
-            </a:r>
-            <a:r>
-              <a:rPr lang="fr-FR" dirty="0" smtClean="0"/>
-              <a:t> aléatoire)</a:t>
-            </a:r>
-            <a:endParaRPr lang="en-US" dirty="0"/>
+              <a:rPr lang="fr-FR" dirty="0" smtClean="0"/>
+              <a:t>Classification (Forêt aléatoire)</a:t>
+            </a:r>
+            <a:endParaRPr lang="fr-FR" dirty="0"/>
           </a:p>
         </p:txBody>
       </p:sp>
@@ -8192,48 +8046,67 @@
           <a:bodyPr/>
           <a:lstStyle/>
           <a:p>
-            <a:r>
-              <a:rPr lang="en-US" dirty="0"/>
-              <a:t>Accuracy : 42</a:t>
-            </a:r>
-            <a:r>
-              <a:rPr lang="en-US" dirty="0" smtClean="0"/>
-              <a:t>%</a:t>
-            </a:r>
-          </a:p>
-          <a:p>
-            <a:r>
-              <a:rPr lang="en-US" dirty="0" err="1" smtClean="0"/>
-              <a:t>Précision</a:t>
-            </a:r>
-            <a:r>
-              <a:rPr lang="en-US" dirty="0" smtClean="0"/>
+            <a:pPr marL="0" indent="0" algn="ctr">
+              <a:buNone/>
+            </a:pPr>
+            <a:r>
+              <a:rPr lang="fr-FR" b="1" dirty="0"/>
+              <a:t>Profondeur plafonnée à </a:t>
+            </a:r>
+            <a:r>
+              <a:rPr lang="fr-FR" b="1" dirty="0" smtClean="0"/>
+              <a:t>25</a:t>
+            </a:r>
+            <a:endParaRPr lang="fr-FR" b="1" dirty="0" smtClean="0"/>
+          </a:p>
+          <a:p>
+            <a:pPr marL="0" indent="0" algn="ctr">
+              <a:buNone/>
+            </a:pPr>
+            <a:r>
+              <a:rPr lang="fr-FR" b="1" dirty="0" smtClean="0"/>
+              <a:t>Avec 63 arbres</a:t>
+            </a:r>
+            <a:endParaRPr lang="fr-FR" dirty="0" smtClean="0"/>
+          </a:p>
+          <a:p>
+            <a:r>
+              <a:rPr lang="fr-FR" dirty="0" err="1" smtClean="0"/>
+              <a:t>Accuracy</a:t>
+            </a:r>
+            <a:r>
+              <a:rPr lang="fr-FR" dirty="0" smtClean="0"/>
+              <a:t> : </a:t>
+            </a:r>
+            <a:r>
+              <a:rPr lang="fr-FR" dirty="0" smtClean="0"/>
+              <a:t>45%</a:t>
+            </a:r>
+          </a:p>
+          <a:p>
+            <a:r>
+              <a:rPr lang="fr-FR" dirty="0" smtClean="0"/>
+              <a:t>Précision moyenne : 29.2%</a:t>
+            </a:r>
+          </a:p>
+          <a:p>
+            <a:r>
+              <a:rPr lang="fr-FR" dirty="0" err="1" smtClean="0"/>
+              <a:t>Recall</a:t>
+            </a:r>
+            <a:r>
+              <a:rPr lang="fr-FR" dirty="0" smtClean="0"/>
               <a:t> </a:t>
             </a:r>
             <a:r>
-              <a:rPr lang="en-US" dirty="0" err="1" smtClean="0"/>
-              <a:t>moyenne</a:t>
-            </a:r>
-            <a:r>
-              <a:rPr lang="en-US" dirty="0" smtClean="0"/>
-              <a:t> : 25.4%</a:t>
-            </a:r>
-            <a:endParaRPr lang="en-US" dirty="0"/>
-          </a:p>
-          <a:p>
-            <a:r>
-              <a:rPr lang="en-US" dirty="0" smtClean="0"/>
-              <a:t>Recall </a:t>
-            </a:r>
-            <a:r>
-              <a:rPr lang="en-US" dirty="0" err="1" smtClean="0"/>
-              <a:t>moyen</a:t>
-            </a:r>
-            <a:r>
-              <a:rPr lang="en-US" dirty="0" smtClean="0"/>
-              <a:t> : 19.7%</a:t>
-            </a:r>
-            <a:endParaRPr lang="en-US" dirty="0"/>
+              <a:rPr lang="fr-FR" dirty="0" smtClean="0"/>
+              <a:t>moyen : </a:t>
+            </a:r>
+            <a:r>
+              <a:rPr lang="fr-FR" dirty="0" smtClean="0"/>
+              <a:t>20.46%</a:t>
+            </a:r>
+            <a:endParaRPr lang="fr-FR" dirty="0"/>
           </a:p>
         </p:txBody>
       </p:sp>
@@ -8259,8 +8132,8 @@
         </p:blipFill>
         <p:spPr>
           <a:xfrm>
-            <a:off x="4836556" y="3191659"/>
-            <a:ext cx="5133286" cy="1902856"/>
+            <a:off x="5768693" y="4117935"/>
+            <a:ext cx="4860306" cy="1902856"/>
           </a:xfrm>
           <a:prstGeom prst="rect">
             <a:avLst/>
@@ -8787,11 +8660,7 @@
           <a:p>
             <a:r>
               <a:rPr lang="fr-FR" dirty="0" smtClean="0"/>
-              <a:t>1 ligne = 1 </a:t>
-            </a:r>
-            <a:r>
-              <a:rPr lang="fr-FR" dirty="0" smtClean="0"/>
-              <a:t>transaction</a:t>
+              <a:t>1 ligne = 1 transaction</a:t>
             </a:r>
           </a:p>
           <a:p>
@@ -8799,7 +8668,6 @@
               <a:rPr lang="fr-FR" dirty="0" smtClean="0"/>
               <a:t>~ 537 k lignes</a:t>
             </a:r>
-            <a:endParaRPr lang="fr-FR" dirty="0" smtClean="0"/>
           </a:p>
           <a:p>
             <a:endParaRPr lang="fr-FR" dirty="0" smtClean="0"/>
@@ -9215,30 +9083,6 @@
           </a:p>
         </p:txBody>
       </p:sp>
-      <p:sp>
-        <p:nvSpPr>
-          <p:cNvPr id="3" name="Content Placeholder 2"/>
-          <p:cNvSpPr>
-            <a:spLocks noGrp="1"/>
-          </p:cNvSpPr>
-          <p:nvPr>
-            <p:ph idx="1"/>
-          </p:nvPr>
-        </p:nvSpPr>
-        <p:spPr>
-          <a:xfrm>
-            <a:off x="1371600" y="1448790"/>
-            <a:ext cx="9601200" cy="4418610"/>
-          </a:xfrm>
-        </p:spPr>
-        <p:txBody>
-          <a:bodyPr/>
-          <a:lstStyle/>
-          <a:p>
-            <a:endParaRPr lang="en-US" dirty="0"/>
-          </a:p>
-        </p:txBody>
-      </p:sp>
     </p:spTree>
     <p:extLst>
       <p:ext uri="{BB962C8B-B14F-4D97-AF65-F5344CB8AC3E}">
@@ -10221,11 +10065,7 @@
           <a:p>
             <a:r>
               <a:rPr lang="fr-FR" dirty="0" smtClean="0"/>
-              <a:t>1 ligne = 1 </a:t>
-            </a:r>
-            <a:r>
-              <a:rPr lang="fr-FR" dirty="0" smtClean="0"/>
-              <a:t>transaction</a:t>
+              <a:t>1 ligne = 1 transaction</a:t>
             </a:r>
           </a:p>
           <a:p>
@@ -10239,7 +10079,6 @@
               <a:rPr lang="fr-FR" dirty="0" smtClean="0"/>
               <a:t>Informations sur l’utilisateur : ID, Sexe, Age, Occupation (profession), État civil, Catégorie de la ville</a:t>
             </a:r>
-            <a:endParaRPr lang="fr-FR" dirty="0" smtClean="0"/>
           </a:p>
           <a:p>
             <a:endParaRPr lang="fr-FR" dirty="0" smtClean="0"/>
@@ -10646,11 +10485,7 @@
           <a:p>
             <a:r>
               <a:rPr lang="fr-FR" dirty="0" smtClean="0"/>
-              <a:t>1 ligne = 1 </a:t>
-            </a:r>
-            <a:r>
-              <a:rPr lang="fr-FR" dirty="0" smtClean="0"/>
-              <a:t>transaction</a:t>
+              <a:t>1 ligne = 1 transaction</a:t>
             </a:r>
           </a:p>
           <a:p>
@@ -10686,7 +10521,6 @@
               <a:rPr lang="fr-FR" dirty="0" smtClean="0"/>
               <a:t>)</a:t>
             </a:r>
-            <a:endParaRPr lang="fr-FR" dirty="0" smtClean="0"/>
           </a:p>
           <a:p>
             <a:endParaRPr lang="fr-FR" dirty="0" smtClean="0"/>
@@ -10775,11 +10609,7 @@
           <a:p>
             <a:r>
               <a:rPr lang="fr-FR" dirty="0" smtClean="0"/>
-              <a:t>1 ligne = 1 </a:t>
-            </a:r>
-            <a:r>
-              <a:rPr lang="fr-FR" dirty="0" smtClean="0"/>
-              <a:t>transaction</a:t>
+              <a:t>1 ligne = 1 transaction</a:t>
             </a:r>
           </a:p>
           <a:p>
@@ -10821,7 +10651,6 @@
               <a:rPr lang="fr-FR" dirty="0" smtClean="0"/>
               <a:t>Coût de la transaction</a:t>
             </a:r>
-            <a:endParaRPr lang="fr-FR" dirty="0" smtClean="0"/>
           </a:p>
           <a:p>
             <a:endParaRPr lang="fr-FR" dirty="0" smtClean="0"/>

</xml_diff>

<commit_message>
Updated the datatypes in dataset description table in slide N° 9 with the right datatypes
</commit_message>
<xml_diff>
--- a/presentation/fdd-hk-presentation-bf.pptx
+++ b/presentation/fdd-hk-presentation-bf.pptx
@@ -5564,7 +5564,19 @@
             <a:pPr lvl="1"/>
             <a:r>
               <a:rPr lang="fr-FR" sz="2600" dirty="0" smtClean="0"/>
-              <a:t>Modèles utilisés : Régression linéaire, par Arbre de décision, par forêt aléatoire</a:t>
+              <a:t>Modèles utilisés : Régression linéaire, par Arbre de </a:t>
+            </a:r>
+            <a:r>
+              <a:rPr lang="fr-FR" sz="2600" dirty="0" smtClean="0"/>
+              <a:t>Décision</a:t>
+            </a:r>
+            <a:r>
+              <a:rPr lang="fr-FR" sz="2600" dirty="0" smtClean="0"/>
+              <a:t>, par </a:t>
+            </a:r>
+            <a:r>
+              <a:rPr lang="fr-FR" sz="2600" dirty="0" smtClean="0"/>
+              <a:t>Forêt Aléatoire</a:t>
             </a:r>
             <a:endParaRPr lang="fr-FR" sz="2600" dirty="0"/>
           </a:p>
@@ -8057,7 +8069,6 @@
               <a:rPr lang="fr-FR" b="1" dirty="0" smtClean="0"/>
               <a:t>25</a:t>
             </a:r>
-            <a:endParaRPr lang="fr-FR" b="1" dirty="0" smtClean="0"/>
           </a:p>
           <a:p>
             <a:pPr marL="0" indent="0" algn="ctr">
@@ -8076,11 +8087,7 @@
             </a:r>
             <a:r>
               <a:rPr lang="fr-FR" dirty="0" smtClean="0"/>
-              <a:t> : </a:t>
-            </a:r>
-            <a:r>
-              <a:rPr lang="fr-FR" dirty="0" smtClean="0"/>
-              <a:t>45%</a:t>
+              <a:t> : 45%</a:t>
             </a:r>
           </a:p>
           <a:p>
@@ -8096,15 +8103,7 @@
             </a:r>
             <a:r>
               <a:rPr lang="fr-FR" dirty="0" smtClean="0"/>
-              <a:t> </a:t>
-            </a:r>
-            <a:r>
-              <a:rPr lang="fr-FR" dirty="0" smtClean="0"/>
-              <a:t>moyen : </a:t>
-            </a:r>
-            <a:r>
-              <a:rPr lang="fr-FR" dirty="0" smtClean="0"/>
-              <a:t>20.46%</a:t>
+              <a:t> moyen : 20.46%</a:t>
             </a:r>
             <a:endParaRPr lang="fr-FR" dirty="0"/>
           </a:p>
@@ -10872,7 +10871,7 @@
           <p:nvPr>
             <p:extLst>
               <p:ext uri="{D42A27DB-BD31-4B8C-83A1-F6EECF244321}">
-                <p14:modId xmlns:p14="http://schemas.microsoft.com/office/powerpoint/2010/main" val="2136407275"/>
+                <p14:modId xmlns:p14="http://schemas.microsoft.com/office/powerpoint/2010/main" val="1683865909"/>
               </p:ext>
             </p:extLst>
           </p:nvPr>
@@ -11014,7 +11013,15 @@
                     <a:p>
                       <a:r>
                         <a:rPr lang="en-US" dirty="0" err="1" smtClean="0"/>
-                        <a:t>Entier</a:t>
+                        <a:t>Chaine</a:t>
+                      </a:r>
+                      <a:r>
+                        <a:rPr lang="en-US" dirty="0" smtClean="0"/>
+                        <a:t> de </a:t>
+                      </a:r>
+                      <a:r>
+                        <a:rPr lang="en-US" dirty="0" err="1" smtClean="0"/>
+                        <a:t>caractères</a:t>
                       </a:r>
                       <a:endParaRPr lang="en-US" dirty="0"/>
                     </a:p>
@@ -11268,11 +11275,36 @@
                     <a:bodyPr/>
                     <a:lstStyle/>
                     <a:p>
+                      <a:pPr marL="0" marR="0" indent="0" algn="l" defTabSz="914400" rtl="0" eaLnBrk="1" fontAlgn="auto" latinLnBrk="0" hangingPunct="1">
+                        <a:lnSpc>
+                          <a:spcPct val="100000"/>
+                        </a:lnSpc>
+                        <a:spcBef>
+                          <a:spcPts val="0"/>
+                        </a:spcBef>
+                        <a:spcAft>
+                          <a:spcPts val="0"/>
+                        </a:spcAft>
+                        <a:buClrTx/>
+                        <a:buSzTx/>
+                        <a:buFontTx/>
+                        <a:buNone/>
+                        <a:tabLst/>
+                        <a:defRPr/>
+                      </a:pPr>
                       <a:r>
                         <a:rPr lang="en-US" dirty="0" err="1" smtClean="0"/>
-                        <a:t>Entier</a:t>
+                        <a:t>Chaine</a:t>
                       </a:r>
-                      <a:endParaRPr lang="en-US" dirty="0"/>
+                      <a:r>
+                        <a:rPr lang="en-US" dirty="0" smtClean="0"/>
+                        <a:t> de </a:t>
+                      </a:r>
+                      <a:r>
+                        <a:rPr lang="en-US" dirty="0" err="1" smtClean="0"/>
+                        <a:t>caractères</a:t>
+                      </a:r>
+                      <a:endParaRPr lang="en-US" dirty="0" smtClean="0"/>
                     </a:p>
                   </a:txBody>
                   <a:tcPr/>

</xml_diff>

<commit_message>
Made some changes after proofreading
</commit_message>
<xml_diff>
--- a/presentation/fdd-hk-presentation-bf.pptx
+++ b/presentation/fdd-hk-presentation-bf.pptx
@@ -39,23 +39,24 @@
     <p:sldId id="270" r:id="rId33"/>
     <p:sldId id="275" r:id="rId34"/>
     <p:sldId id="276" r:id="rId35"/>
-    <p:sldId id="277" r:id="rId36"/>
-    <p:sldId id="278" r:id="rId37"/>
-    <p:sldId id="279" r:id="rId38"/>
-    <p:sldId id="281" r:id="rId39"/>
-    <p:sldId id="309" r:id="rId40"/>
-    <p:sldId id="310" r:id="rId41"/>
-    <p:sldId id="284" r:id="rId42"/>
-    <p:sldId id="285" r:id="rId43"/>
-    <p:sldId id="286" r:id="rId44"/>
-    <p:sldId id="287" r:id="rId45"/>
-    <p:sldId id="288" r:id="rId46"/>
-    <p:sldId id="289" r:id="rId47"/>
-    <p:sldId id="302" r:id="rId48"/>
-    <p:sldId id="303" r:id="rId49"/>
-    <p:sldId id="304" r:id="rId50"/>
-    <p:sldId id="305" r:id="rId51"/>
-    <p:sldId id="306" r:id="rId52"/>
+    <p:sldId id="311" r:id="rId36"/>
+    <p:sldId id="277" r:id="rId37"/>
+    <p:sldId id="278" r:id="rId38"/>
+    <p:sldId id="279" r:id="rId39"/>
+    <p:sldId id="281" r:id="rId40"/>
+    <p:sldId id="309" r:id="rId41"/>
+    <p:sldId id="310" r:id="rId42"/>
+    <p:sldId id="284" r:id="rId43"/>
+    <p:sldId id="285" r:id="rId44"/>
+    <p:sldId id="286" r:id="rId45"/>
+    <p:sldId id="287" r:id="rId46"/>
+    <p:sldId id="288" r:id="rId47"/>
+    <p:sldId id="289" r:id="rId48"/>
+    <p:sldId id="302" r:id="rId49"/>
+    <p:sldId id="303" r:id="rId50"/>
+    <p:sldId id="304" r:id="rId51"/>
+    <p:sldId id="305" r:id="rId52"/>
+    <p:sldId id="306" r:id="rId53"/>
   </p:sldIdLst>
   <p:sldSz cx="12192000" cy="6858000"/>
   <p:notesSz cx="6858000" cy="9144000"/>
@@ -4949,8 +4950,8 @@
         </p:nvSpPr>
         <p:spPr>
           <a:xfrm>
-            <a:off x="1485179" y="1614489"/>
-            <a:ext cx="5125828" cy="4252912"/>
+            <a:off x="2174487" y="1614489"/>
+            <a:ext cx="4436519" cy="4252912"/>
           </a:xfrm>
           <a:prstGeom prst="rect">
             <a:avLst/>
@@ -5048,8 +5049,8 @@
         </p:nvCxnSpPr>
         <p:spPr>
           <a:xfrm rot="5400000" flipH="1" flipV="1">
-            <a:off x="7287101" y="2628391"/>
-            <a:ext cx="2" cy="6478018"/>
+            <a:off x="7459428" y="2800718"/>
+            <a:ext cx="2" cy="6133364"/>
           </a:xfrm>
           <a:prstGeom prst="bentConnector3">
             <a:avLst>
@@ -5212,8 +5213,8 @@
         </p:nvSpPr>
         <p:spPr>
           <a:xfrm>
-            <a:off x="1485179" y="1614489"/>
-            <a:ext cx="5125828" cy="4252912"/>
+            <a:off x="2174487" y="1614489"/>
+            <a:ext cx="4436519" cy="4252912"/>
           </a:xfrm>
           <a:prstGeom prst="rect">
             <a:avLst/>
@@ -5355,8 +5356,8 @@
         </p:nvCxnSpPr>
         <p:spPr>
           <a:xfrm rot="5400000" flipH="1" flipV="1">
-            <a:off x="7287101" y="2628391"/>
-            <a:ext cx="2" cy="6478018"/>
+            <a:off x="7459428" y="2800718"/>
+            <a:ext cx="2" cy="6133364"/>
           </a:xfrm>
           <a:prstGeom prst="bentConnector3">
             <a:avLst>
@@ -5942,14 +5943,30 @@
             <a:pPr lvl="1"/>
             <a:r>
               <a:rPr lang="fr-FR" dirty="0" smtClean="0"/>
-              <a:t>Catégorie 2 = {2, …, 18} 		=&gt;	Catégorie 1 = {B, …, R, 0}</a:t>
+              <a:t>Catégorie 2 = {2, …, 18} 		=&gt;	Catégorie </a:t>
+            </a:r>
+            <a:r>
+              <a:rPr lang="fr-FR" dirty="0" smtClean="0"/>
+              <a:t>2 </a:t>
+            </a:r>
+            <a:r>
+              <a:rPr lang="fr-FR" dirty="0" smtClean="0"/>
+              <a:t>= {B, …, R, 0}</a:t>
             </a:r>
           </a:p>
           <a:p>
             <a:pPr lvl="1"/>
             <a:r>
               <a:rPr lang="fr-FR" dirty="0" smtClean="0"/>
-              <a:t>Catégorie 3 = {3, …, 18} 		=&gt;	Catégorie 1 = {C, …, R, 0}</a:t>
+              <a:t>Catégorie 3 = {3, …, 18} 		=&gt;	Catégorie </a:t>
+            </a:r>
+            <a:r>
+              <a:rPr lang="fr-FR" dirty="0" smtClean="0"/>
+              <a:t>3 </a:t>
+            </a:r>
+            <a:r>
+              <a:rPr lang="fr-FR" dirty="0" smtClean="0"/>
+              <a:t>= {C, …, R, 0}</a:t>
             </a:r>
           </a:p>
           <a:p>
@@ -6057,14 +6074,30 @@
             <a:pPr lvl="1"/>
             <a:r>
               <a:rPr lang="fr-FR" dirty="0" smtClean="0"/>
-              <a:t>Catégorie 2 = {2, …, 18} 		=&gt;	Catégorie 1 = {B, …, R, 0}</a:t>
+              <a:t>Catégorie 2 = {2, …, 18} 		=&gt;	Catégorie </a:t>
+            </a:r>
+            <a:r>
+              <a:rPr lang="fr-FR" dirty="0" smtClean="0"/>
+              <a:t>2 </a:t>
+            </a:r>
+            <a:r>
+              <a:rPr lang="fr-FR" dirty="0" smtClean="0"/>
+              <a:t>= {B, …, R, 0}</a:t>
             </a:r>
           </a:p>
           <a:p>
             <a:pPr lvl="1"/>
             <a:r>
               <a:rPr lang="fr-FR" dirty="0" smtClean="0"/>
-              <a:t>Catégorie 3 = {3, …, 18} 		=&gt;	Catégorie 1 = {C, …, R, 0}</a:t>
+              <a:t>Catégorie 3 = {3, …, 18} 		=&gt;	Catégorie </a:t>
+            </a:r>
+            <a:r>
+              <a:rPr lang="fr-FR" dirty="0" smtClean="0"/>
+              <a:t>3 </a:t>
+            </a:r>
+            <a:r>
+              <a:rPr lang="fr-FR" dirty="0" smtClean="0"/>
+              <a:t>= {C, …, R, 0}</a:t>
             </a:r>
           </a:p>
           <a:p>
@@ -6241,14 +6274,30 @@
             <a:pPr lvl="1"/>
             <a:r>
               <a:rPr lang="fr-FR" dirty="0" smtClean="0"/>
-              <a:t>Catégorie 2 = {2, …, 18} 		=&gt;	Catégorie 1 = {B, …, R, 0}</a:t>
+              <a:t>Catégorie 2 = {2, …, 18} 		=&gt;	Catégorie </a:t>
+            </a:r>
+            <a:r>
+              <a:rPr lang="fr-FR" dirty="0" smtClean="0"/>
+              <a:t>2 </a:t>
+            </a:r>
+            <a:r>
+              <a:rPr lang="fr-FR" dirty="0" smtClean="0"/>
+              <a:t>= {B, …, R, 0}</a:t>
             </a:r>
           </a:p>
           <a:p>
             <a:pPr lvl="1"/>
             <a:r>
               <a:rPr lang="fr-FR" dirty="0" smtClean="0"/>
-              <a:t>Catégorie 3 = {3, …, 18} 		=&gt;	Catégorie 1 = {C, …, R, 0}</a:t>
+              <a:t>Catégorie 3 = {3, …, 18} 		=&gt;	Catégorie </a:t>
+            </a:r>
+            <a:r>
+              <a:rPr lang="fr-FR" dirty="0" smtClean="0"/>
+              <a:t>3 </a:t>
+            </a:r>
+            <a:r>
+              <a:rPr lang="fr-FR" dirty="0" smtClean="0"/>
+              <a:t>= {C, …, R, 0}</a:t>
             </a:r>
           </a:p>
           <a:p>
@@ -6430,14 +6479,30 @@
             <a:pPr lvl="1"/>
             <a:r>
               <a:rPr lang="fr-FR" dirty="0" smtClean="0"/>
-              <a:t>Catégorie 2 = {2, …, 18} 		=&gt;	Catégorie 1 = {B, …, R, 0}</a:t>
+              <a:t>Catégorie 2 = {2, …, 18} 		=&gt;	Catégorie </a:t>
+            </a:r>
+            <a:r>
+              <a:rPr lang="fr-FR" dirty="0" smtClean="0"/>
+              <a:t>2 </a:t>
+            </a:r>
+            <a:r>
+              <a:rPr lang="fr-FR" dirty="0" smtClean="0"/>
+              <a:t>= {B, …, R, 0}</a:t>
             </a:r>
           </a:p>
           <a:p>
             <a:pPr lvl="1"/>
             <a:r>
               <a:rPr lang="fr-FR" dirty="0" smtClean="0"/>
-              <a:t>Catégorie 3 = {3, …, 18} 		=&gt;	Catégorie 1 = {C, …, R, 0}</a:t>
+              <a:t>Catégorie 3 = {3, …, 18} 		=&gt;	Catégorie </a:t>
+            </a:r>
+            <a:r>
+              <a:rPr lang="fr-FR" dirty="0" smtClean="0"/>
+              <a:t>3 </a:t>
+            </a:r>
+            <a:r>
+              <a:rPr lang="fr-FR" dirty="0" smtClean="0"/>
+              <a:t>= {C, …, R, 0}</a:t>
             </a:r>
           </a:p>
           <a:p>
@@ -6638,14 +6703,30 @@
             <a:pPr lvl="1"/>
             <a:r>
               <a:rPr lang="fr-FR" dirty="0" smtClean="0"/>
-              <a:t>Catégorie 2 = {2, …, 18} 		=&gt;	Catégorie 1 = {B, …, R, 0}</a:t>
+              <a:t>Catégorie 2 = {2, …, 18} 		=&gt;	Catégorie </a:t>
+            </a:r>
+            <a:r>
+              <a:rPr lang="fr-FR" dirty="0" smtClean="0"/>
+              <a:t>2 </a:t>
+            </a:r>
+            <a:r>
+              <a:rPr lang="fr-FR" dirty="0" smtClean="0"/>
+              <a:t>= {B, …, R, 0}</a:t>
             </a:r>
           </a:p>
           <a:p>
             <a:pPr lvl="1"/>
             <a:r>
               <a:rPr lang="fr-FR" dirty="0" smtClean="0"/>
-              <a:t>Catégorie 3 = {3, …, 18} 		=&gt;	Catégorie 1 = {C, …, R, 0}</a:t>
+              <a:t>Catégorie 3 = {3, …, 18} 		=&gt;	Catégorie </a:t>
+            </a:r>
+            <a:r>
+              <a:rPr lang="fr-FR" dirty="0" smtClean="0"/>
+              <a:t>3 </a:t>
+            </a:r>
+            <a:r>
+              <a:rPr lang="fr-FR" dirty="0" smtClean="0"/>
+              <a:t>= {C, …, R, 0}</a:t>
             </a:r>
           </a:p>
           <a:p>
@@ -7774,29 +7855,21 @@
             </a:r>
             <a:r>
               <a:rPr lang="fr-FR" dirty="0" smtClean="0"/>
-              <a:t> : 97% (Is </a:t>
-            </a:r>
-            <a:r>
-              <a:rPr lang="fr-FR" dirty="0" err="1" smtClean="0"/>
-              <a:t>this</a:t>
-            </a:r>
-            <a:r>
-              <a:rPr lang="fr-FR" dirty="0" smtClean="0"/>
-              <a:t> </a:t>
-            </a:r>
-            <a:r>
-              <a:rPr lang="fr-FR" dirty="0" err="1" smtClean="0"/>
-              <a:t>overfiting</a:t>
-            </a:r>
-            <a:r>
-              <a:rPr lang="fr-FR" dirty="0" smtClean="0"/>
-              <a:t> ?!!!)</a:t>
-            </a:r>
-          </a:p>
-          <a:p>
-            <a:r>
-              <a:rPr lang="fr-FR" dirty="0" smtClean="0"/>
-              <a:t>Précision moyenne : 93.7%</a:t>
+              <a:t> : </a:t>
+            </a:r>
+            <a:r>
+              <a:rPr lang="fr-FR" dirty="0" smtClean="0"/>
+              <a:t>97%</a:t>
+            </a:r>
+          </a:p>
+          <a:p>
+            <a:r>
+              <a:rPr lang="fr-FR" dirty="0" smtClean="0"/>
+              <a:t>Précision </a:t>
+            </a:r>
+            <a:r>
+              <a:rPr lang="fr-FR" dirty="0" smtClean="0"/>
+              <a:t>moyenne : 93.7%</a:t>
             </a:r>
           </a:p>
           <a:p>
@@ -7812,36 +7885,6 @@
           </a:p>
         </p:txBody>
       </p:sp>
-      <p:pic>
-        <p:nvPicPr>
-          <p:cNvPr id="4" name="Picture 3"/>
-          <p:cNvPicPr>
-            <a:picLocks noChangeAspect="1"/>
-          </p:cNvPicPr>
-          <p:nvPr/>
-        </p:nvPicPr>
-        <p:blipFill>
-          <a:blip r:embed="rId2">
-            <a:extLst>
-              <a:ext uri="{28A0092B-C50C-407E-A947-70E740481C1C}">
-                <a14:useLocalDpi xmlns:a14="http://schemas.microsoft.com/office/drawing/2010/main" val="0"/>
-              </a:ext>
-            </a:extLst>
-          </a:blip>
-          <a:stretch>
-            <a:fillRect/>
-          </a:stretch>
-        </p:blipFill>
-        <p:spPr>
-          <a:xfrm>
-            <a:off x="6722423" y="1490848"/>
-            <a:ext cx="2003604" cy="2059379"/>
-          </a:xfrm>
-          <a:prstGeom prst="rect">
-            <a:avLst/>
-          </a:prstGeom>
-        </p:spPr>
-      </p:pic>
     </p:spTree>
     <p:extLst>
       <p:ext uri="{BB962C8B-B14F-4D97-AF65-F5344CB8AC3E}">
@@ -7936,28 +7979,35 @@
           <a:bodyPr/>
           <a:lstStyle/>
           <a:p>
-            <a:pPr marL="0" indent="0" algn="ctr">
-              <a:buNone/>
-            </a:pPr>
-            <a:r>
-              <a:rPr lang="fr-FR" b="1" dirty="0" smtClean="0"/>
-              <a:t>Profondeur plafonnée à 21</a:t>
-            </a:r>
-          </a:p>
-          <a:p>
             <a:r>
               <a:rPr lang="fr-FR" dirty="0" err="1" smtClean="0"/>
               <a:t>Accuracy</a:t>
             </a:r>
             <a:r>
               <a:rPr lang="fr-FR" dirty="0" smtClean="0"/>
-              <a:t> : 85%</a:t>
-            </a:r>
-          </a:p>
-          <a:p>
-            <a:r>
-              <a:rPr lang="fr-FR" dirty="0" smtClean="0"/>
-              <a:t>Précision moyenne : 87.1%</a:t>
+              <a:t> : 97% (Is </a:t>
+            </a:r>
+            <a:r>
+              <a:rPr lang="fr-FR" dirty="0" err="1" smtClean="0"/>
+              <a:t>this</a:t>
+            </a:r>
+            <a:r>
+              <a:rPr lang="fr-FR" dirty="0" smtClean="0"/>
+              <a:t> </a:t>
+            </a:r>
+            <a:r>
+              <a:rPr lang="fr-FR" dirty="0" err="1" smtClean="0"/>
+              <a:t>overfiting</a:t>
+            </a:r>
+            <a:r>
+              <a:rPr lang="fr-FR" dirty="0" smtClean="0"/>
+              <a:t> ?!!!)</a:t>
+            </a:r>
+          </a:p>
+          <a:p>
+            <a:r>
+              <a:rPr lang="fr-FR" dirty="0" smtClean="0"/>
+              <a:t>Précision moyenne : 93.7%</a:t>
             </a:r>
           </a:p>
           <a:p>
@@ -7967,29 +8017,52 @@
             </a:r>
             <a:r>
               <a:rPr lang="fr-FR" dirty="0" smtClean="0"/>
-              <a:t> moyen : 73%</a:t>
+              <a:t> moyen : 93.5%</a:t>
             </a:r>
             <a:endParaRPr lang="fr-FR" dirty="0"/>
           </a:p>
         </p:txBody>
       </p:sp>
+      <p:pic>
+        <p:nvPicPr>
+          <p:cNvPr id="4" name="Picture 3"/>
+          <p:cNvPicPr>
+            <a:picLocks noChangeAspect="1"/>
+          </p:cNvPicPr>
+          <p:nvPr/>
+        </p:nvPicPr>
+        <p:blipFill>
+          <a:blip r:embed="rId2">
+            <a:extLst>
+              <a:ext uri="{28A0092B-C50C-407E-A947-70E740481C1C}">
+                <a14:useLocalDpi xmlns:a14="http://schemas.microsoft.com/office/drawing/2010/main" val="0"/>
+              </a:ext>
+            </a:extLst>
+          </a:blip>
+          <a:stretch>
+            <a:fillRect/>
+          </a:stretch>
+        </p:blipFill>
+        <p:spPr>
+          <a:xfrm>
+            <a:off x="6722423" y="1490848"/>
+            <a:ext cx="2003604" cy="2059379"/>
+          </a:xfrm>
+          <a:prstGeom prst="rect">
+            <a:avLst/>
+          </a:prstGeom>
+        </p:spPr>
+      </p:pic>
     </p:spTree>
     <p:extLst>
       <p:ext uri="{BB962C8B-B14F-4D97-AF65-F5344CB8AC3E}">
-        <p14:creationId xmlns:p14="http://schemas.microsoft.com/office/powerpoint/2010/main" val="689222063"/>
+        <p14:creationId xmlns:p14="http://schemas.microsoft.com/office/powerpoint/2010/main" val="224883083"/>
       </p:ext>
     </p:extLst>
   </p:cSld>
   <p:clrMapOvr>
     <a:masterClrMapping/>
   </p:clrMapOvr>
-  <p:timing>
-    <p:tnLst>
-      <p:par>
-        <p:cTn id="1" dur="indefinite" restart="never" nodeType="tmRoot"/>
-      </p:par>
-    </p:tnLst>
-  </p:timing>
 </p:sld>
 </file>
 
@@ -8023,18 +8096,34 @@
         <p:spPr>
           <a:xfrm>
             <a:off x="1371600" y="685800"/>
-            <a:ext cx="9601200" cy="893618"/>
-          </a:xfrm>
-        </p:spPr>
-        <p:txBody>
-          <a:bodyPr/>
-          <a:lstStyle/>
-          <a:p>
-            <a:r>
-              <a:rPr lang="fr-FR" dirty="0" smtClean="0"/>
-              <a:t>Classification (Forêt aléatoire)</a:t>
-            </a:r>
-            <a:endParaRPr lang="fr-FR" dirty="0"/>
+            <a:ext cx="9601200" cy="917369"/>
+          </a:xfrm>
+        </p:spPr>
+        <p:txBody>
+          <a:bodyPr/>
+          <a:lstStyle/>
+          <a:p>
+            <a:r>
+              <a:rPr lang="en-US" dirty="0" smtClean="0"/>
+              <a:t>Classification (</a:t>
+            </a:r>
+            <a:r>
+              <a:rPr lang="en-US" dirty="0" err="1" smtClean="0"/>
+              <a:t>Arbre</a:t>
+            </a:r>
+            <a:r>
+              <a:rPr lang="en-US" dirty="0" smtClean="0"/>
+              <a:t> de </a:t>
+            </a:r>
+            <a:r>
+              <a:rPr lang="en-US" dirty="0" err="1" smtClean="0"/>
+              <a:t>décision</a:t>
+            </a:r>
+            <a:r>
+              <a:rPr lang="en-US" dirty="0" smtClean="0"/>
+              <a:t>)</a:t>
+            </a:r>
+            <a:endParaRPr lang="en-US" dirty="0"/>
           </a:p>
         </p:txBody>
       </p:sp>
@@ -8050,8 +8139,8 @@
         </p:nvSpPr>
         <p:spPr>
           <a:xfrm>
-            <a:off x="1371600" y="1721922"/>
-            <a:ext cx="9601200" cy="4145478"/>
+            <a:off x="1371600" y="1603169"/>
+            <a:ext cx="9601200" cy="4264231"/>
           </a:xfrm>
         </p:spPr>
         <p:txBody>
@@ -8062,23 +8151,9 @@
               <a:buNone/>
             </a:pPr>
             <a:r>
-              <a:rPr lang="fr-FR" b="1" dirty="0"/>
-              <a:t>Profondeur plafonnée à </a:t>
-            </a:r>
-            <a:r>
               <a:rPr lang="fr-FR" b="1" dirty="0" smtClean="0"/>
-              <a:t>25</a:t>
-            </a:r>
-          </a:p>
-          <a:p>
-            <a:pPr marL="0" indent="0" algn="ctr">
-              <a:buNone/>
-            </a:pPr>
-            <a:r>
-              <a:rPr lang="fr-FR" b="1" dirty="0" smtClean="0"/>
-              <a:t>Avec 63 arbres</a:t>
-            </a:r>
-            <a:endParaRPr lang="fr-FR" dirty="0" smtClean="0"/>
+              <a:t>Profondeur plafonnée à 21</a:t>
+            </a:r>
           </a:p>
           <a:p>
             <a:r>
@@ -8087,13 +8162,13 @@
             </a:r>
             <a:r>
               <a:rPr lang="fr-FR" dirty="0" smtClean="0"/>
-              <a:t> : 45%</a:t>
-            </a:r>
-          </a:p>
-          <a:p>
-            <a:r>
-              <a:rPr lang="fr-FR" dirty="0" smtClean="0"/>
-              <a:t>Précision moyenne : 29.2%</a:t>
+              <a:t> : 85%</a:t>
+            </a:r>
+          </a:p>
+          <a:p>
+            <a:r>
+              <a:rPr lang="fr-FR" dirty="0" smtClean="0"/>
+              <a:t>Précision moyenne : 87.1%</a:t>
             </a:r>
           </a:p>
           <a:p>
@@ -8103,46 +8178,16 @@
             </a:r>
             <a:r>
               <a:rPr lang="fr-FR" dirty="0" smtClean="0"/>
-              <a:t> moyen : 20.46%</a:t>
+              <a:t> moyen : 73%</a:t>
             </a:r>
             <a:endParaRPr lang="fr-FR" dirty="0"/>
           </a:p>
         </p:txBody>
       </p:sp>
-      <p:pic>
-        <p:nvPicPr>
-          <p:cNvPr id="4" name="Picture 3"/>
-          <p:cNvPicPr>
-            <a:picLocks noChangeAspect="1"/>
-          </p:cNvPicPr>
-          <p:nvPr/>
-        </p:nvPicPr>
-        <p:blipFill>
-          <a:blip r:embed="rId2">
-            <a:extLst>
-              <a:ext uri="{28A0092B-C50C-407E-A947-70E740481C1C}">
-                <a14:useLocalDpi xmlns:a14="http://schemas.microsoft.com/office/drawing/2010/main" val="0"/>
-              </a:ext>
-            </a:extLst>
-          </a:blip>
-          <a:stretch>
-            <a:fillRect/>
-          </a:stretch>
-        </p:blipFill>
-        <p:spPr>
-          <a:xfrm>
-            <a:off x="5768693" y="4117935"/>
-            <a:ext cx="4860306" cy="1902856"/>
-          </a:xfrm>
-          <a:prstGeom prst="rect">
-            <a:avLst/>
-          </a:prstGeom>
-        </p:spPr>
-      </p:pic>
     </p:spTree>
     <p:extLst>
       <p:ext uri="{BB962C8B-B14F-4D97-AF65-F5344CB8AC3E}">
-        <p14:creationId xmlns:p14="http://schemas.microsoft.com/office/powerpoint/2010/main" val="651588316"/>
+        <p14:creationId xmlns:p14="http://schemas.microsoft.com/office/powerpoint/2010/main" val="689222063"/>
       </p:ext>
     </p:extLst>
   </p:cSld>
@@ -8197,18 +8242,10 @@
           <a:lstStyle/>
           <a:p>
             <a:r>
-              <a:rPr lang="en-US" dirty="0" smtClean="0"/>
-              <a:t>Classification (For</a:t>
-            </a:r>
-            <a:r>
-              <a:rPr lang="fr-FR" dirty="0" err="1" smtClean="0"/>
-              <a:t>êt</a:t>
-            </a:r>
-            <a:r>
-              <a:rPr lang="fr-FR" dirty="0" smtClean="0"/>
-              <a:t> aléatoire)</a:t>
-            </a:r>
-            <a:endParaRPr lang="en-US" dirty="0"/>
+              <a:rPr lang="fr-FR" dirty="0" smtClean="0"/>
+              <a:t>Classification (Forêt aléatoire)</a:t>
+            </a:r>
+            <a:endParaRPr lang="fr-FR" dirty="0"/>
           </a:p>
         </p:txBody>
       </p:sp>
@@ -8232,42 +8269,54 @@
           <a:bodyPr/>
           <a:lstStyle/>
           <a:p>
-            <a:r>
-              <a:rPr lang="en-US" dirty="0"/>
-              <a:t>Accuracy : 42%</a:t>
-            </a:r>
-          </a:p>
-          <a:p>
-            <a:r>
-              <a:rPr lang="en-US" dirty="0" err="1"/>
-              <a:t>Précision</a:t>
-            </a:r>
-            <a:r>
-              <a:rPr lang="en-US" dirty="0"/>
-              <a:t> </a:t>
-            </a:r>
-            <a:r>
-              <a:rPr lang="en-US" dirty="0" err="1"/>
-              <a:t>moyenne</a:t>
-            </a:r>
-            <a:r>
-              <a:rPr lang="en-US" dirty="0"/>
-              <a:t> : 25.4%</a:t>
-            </a:r>
-          </a:p>
-          <a:p>
-            <a:r>
-              <a:rPr lang="en-US" dirty="0"/>
-              <a:t>Recall </a:t>
-            </a:r>
-            <a:r>
-              <a:rPr lang="en-US" dirty="0" err="1"/>
-              <a:t>moyen</a:t>
-            </a:r>
-            <a:r>
-              <a:rPr lang="en-US" dirty="0"/>
-              <a:t> : 19.7%</a:t>
-            </a:r>
+            <a:pPr marL="0" indent="0" algn="ctr">
+              <a:buNone/>
+            </a:pPr>
+            <a:r>
+              <a:rPr lang="fr-FR" b="1" dirty="0"/>
+              <a:t>Profondeur plafonnée à </a:t>
+            </a:r>
+            <a:r>
+              <a:rPr lang="fr-FR" b="1" dirty="0" smtClean="0"/>
+              <a:t>25</a:t>
+            </a:r>
+          </a:p>
+          <a:p>
+            <a:pPr marL="0" indent="0" algn="ctr">
+              <a:buNone/>
+            </a:pPr>
+            <a:r>
+              <a:rPr lang="fr-FR" b="1" dirty="0" smtClean="0"/>
+              <a:t>Avec 63 arbres</a:t>
+            </a:r>
+            <a:endParaRPr lang="fr-FR" dirty="0" smtClean="0"/>
+          </a:p>
+          <a:p>
+            <a:r>
+              <a:rPr lang="fr-FR" dirty="0" err="1" smtClean="0"/>
+              <a:t>Accuracy</a:t>
+            </a:r>
+            <a:r>
+              <a:rPr lang="fr-FR" dirty="0" smtClean="0"/>
+              <a:t> : 45%</a:t>
+            </a:r>
+          </a:p>
+          <a:p>
+            <a:r>
+              <a:rPr lang="fr-FR" dirty="0" smtClean="0"/>
+              <a:t>Précision moyenne : 29.2%</a:t>
+            </a:r>
+          </a:p>
+          <a:p>
+            <a:r>
+              <a:rPr lang="fr-FR" dirty="0" err="1" smtClean="0"/>
+              <a:t>Recall</a:t>
+            </a:r>
+            <a:r>
+              <a:rPr lang="fr-FR" dirty="0" smtClean="0"/>
+              <a:t> moyen : 20.46%</a:t>
+            </a:r>
+            <a:endParaRPr lang="fr-FR" dirty="0"/>
           </a:p>
         </p:txBody>
       </p:sp>
@@ -8293,8 +8342,8 @@
         </p:blipFill>
         <p:spPr>
           <a:xfrm>
-            <a:off x="6172200" y="2398446"/>
-            <a:ext cx="5206813" cy="3468954"/>
+            <a:off x="5768693" y="4117935"/>
+            <a:ext cx="4860306" cy="1902856"/>
           </a:xfrm>
           <a:prstGeom prst="rect">
             <a:avLst/>
@@ -8304,7 +8353,7 @@
     </p:spTree>
     <p:extLst>
       <p:ext uri="{BB962C8B-B14F-4D97-AF65-F5344CB8AC3E}">
-        <p14:creationId xmlns:p14="http://schemas.microsoft.com/office/powerpoint/2010/main" val="508960000"/>
+        <p14:creationId xmlns:p14="http://schemas.microsoft.com/office/powerpoint/2010/main" val="651588316"/>
       </p:ext>
     </p:extLst>
   </p:cSld>
@@ -8348,23 +8397,27 @@
             <p:ph type="title"/>
           </p:nvPr>
         </p:nvSpPr>
-        <p:spPr/>
-        <p:txBody>
-          <a:bodyPr/>
-          <a:lstStyle/>
-          <a:p>
-            <a:pPr algn="ctr"/>
+        <p:spPr>
+          <a:xfrm>
+            <a:off x="1371600" y="685800"/>
+            <a:ext cx="9601200" cy="893618"/>
+          </a:xfrm>
+        </p:spPr>
+        <p:txBody>
+          <a:bodyPr/>
+          <a:lstStyle/>
+          <a:p>
             <a:r>
               <a:rPr lang="en-US" dirty="0" smtClean="0"/>
-              <a:t>Regression sur le co</a:t>
+              <a:t>Classification (For</a:t>
             </a:r>
             <a:r>
               <a:rPr lang="fr-FR" dirty="0" err="1" smtClean="0"/>
-              <a:t>ût</a:t>
-            </a:r>
-            <a:r>
-              <a:rPr lang="fr-FR" dirty="0" smtClean="0"/>
-              <a:t>  d’une transaction</a:t>
+              <a:t>êt</a:t>
+            </a:r>
+            <a:r>
+              <a:rPr lang="fr-FR" dirty="0" smtClean="0"/>
+              <a:t> aléatoire)</a:t>
             </a:r>
             <a:endParaRPr lang="en-US" dirty="0"/>
           </a:p>
@@ -8380,48 +8433,110 @@
             <p:ph idx="1"/>
           </p:nvPr>
         </p:nvSpPr>
-        <p:spPr/>
-        <p:txBody>
-          <a:bodyPr/>
-          <a:lstStyle/>
-          <a:p>
-            <a:r>
-              <a:rPr lang="fr-FR" dirty="0" err="1" smtClean="0"/>
-              <a:t>Pré-traitements</a:t>
-            </a:r>
-            <a:endParaRPr lang="fr-FR" dirty="0" smtClean="0"/>
-          </a:p>
-          <a:p>
-            <a:r>
-              <a:rPr lang="fr-FR" dirty="0" smtClean="0"/>
-              <a:t>Encodage</a:t>
-            </a:r>
-          </a:p>
-          <a:p>
-            <a:r>
-              <a:rPr lang="fr-FR" dirty="0" smtClean="0"/>
-              <a:t>Entrainement</a:t>
-            </a:r>
-          </a:p>
-          <a:p>
-            <a:r>
-              <a:rPr lang="fr-FR" dirty="0" smtClean="0"/>
-              <a:t>Mesures de performances</a:t>
+        <p:spPr>
+          <a:xfrm>
+            <a:off x="1371600" y="1721922"/>
+            <a:ext cx="9601200" cy="4145478"/>
+          </a:xfrm>
+        </p:spPr>
+        <p:txBody>
+          <a:bodyPr/>
+          <a:lstStyle/>
+          <a:p>
+            <a:pPr marL="0" indent="0" algn="ctr">
+              <a:buNone/>
+            </a:pPr>
+            <a:r>
+              <a:rPr lang="fr-FR" b="1" dirty="0"/>
+              <a:t>Profondeur plafonnée à 25</a:t>
+            </a:r>
+          </a:p>
+          <a:p>
+            <a:pPr marL="0" indent="0" algn="ctr">
+              <a:buNone/>
+            </a:pPr>
+            <a:r>
+              <a:rPr lang="fr-FR" b="1" dirty="0"/>
+              <a:t>Avec 63 arbres</a:t>
             </a:r>
             <a:endParaRPr lang="fr-FR" dirty="0"/>
           </a:p>
-        </p:txBody>
-      </p:sp>
+          <a:p>
+            <a:r>
+              <a:rPr lang="fr-FR" dirty="0" err="1"/>
+              <a:t>Accuracy</a:t>
+            </a:r>
+            <a:r>
+              <a:rPr lang="fr-FR" dirty="0"/>
+              <a:t> : 45%</a:t>
+            </a:r>
+          </a:p>
+          <a:p>
+            <a:r>
+              <a:rPr lang="fr-FR" dirty="0"/>
+              <a:t>Précision moyenne : 29.2%</a:t>
+            </a:r>
+          </a:p>
+          <a:p>
+            <a:r>
+              <a:rPr lang="fr-FR" dirty="0" err="1"/>
+              <a:t>Recall</a:t>
+            </a:r>
+            <a:r>
+              <a:rPr lang="fr-FR" dirty="0"/>
+              <a:t> moyen : 20.46%</a:t>
+            </a:r>
+            <a:endParaRPr lang="en-US" dirty="0"/>
+          </a:p>
+        </p:txBody>
+      </p:sp>
+      <p:pic>
+        <p:nvPicPr>
+          <p:cNvPr id="4" name="Picture 3"/>
+          <p:cNvPicPr>
+            <a:picLocks noChangeAspect="1"/>
+          </p:cNvPicPr>
+          <p:nvPr/>
+        </p:nvPicPr>
+        <p:blipFill>
+          <a:blip r:embed="rId2">
+            <a:extLst>
+              <a:ext uri="{28A0092B-C50C-407E-A947-70E740481C1C}">
+                <a14:useLocalDpi xmlns:a14="http://schemas.microsoft.com/office/drawing/2010/main" val="0"/>
+              </a:ext>
+            </a:extLst>
+          </a:blip>
+          <a:stretch>
+            <a:fillRect/>
+          </a:stretch>
+        </p:blipFill>
+        <p:spPr>
+          <a:xfrm>
+            <a:off x="6172200" y="2811039"/>
+            <a:ext cx="5206813" cy="3468954"/>
+          </a:xfrm>
+          <a:prstGeom prst="rect">
+            <a:avLst/>
+          </a:prstGeom>
+        </p:spPr>
+      </p:pic>
     </p:spTree>
     <p:extLst>
       <p:ext uri="{BB962C8B-B14F-4D97-AF65-F5344CB8AC3E}">
-        <p14:creationId xmlns:p14="http://schemas.microsoft.com/office/powerpoint/2010/main" val="836097436"/>
+        <p14:creationId xmlns:p14="http://schemas.microsoft.com/office/powerpoint/2010/main" val="508960000"/>
       </p:ext>
     </p:extLst>
   </p:cSld>
   <p:clrMapOvr>
     <a:masterClrMapping/>
   </p:clrMapOvr>
+  <p:timing>
+    <p:tnLst>
+      <p:par>
+        <p:cTn id="1" dur="indefinite" restart="never" nodeType="tmRoot"/>
+      </p:par>
+    </p:tnLst>
+  </p:timing>
 </p:sld>
 </file>
 
@@ -8452,143 +8567,74 @@
             <p:ph type="title"/>
           </p:nvPr>
         </p:nvSpPr>
-        <p:spPr>
-          <a:xfrm>
-            <a:off x="1371600" y="685800"/>
-            <a:ext cx="9601200" cy="929244"/>
-          </a:xfrm>
-        </p:spPr>
-        <p:txBody>
-          <a:bodyPr/>
-          <a:lstStyle/>
-          <a:p>
+        <p:spPr/>
+        <p:txBody>
+          <a:bodyPr/>
+          <a:lstStyle/>
+          <a:p>
+            <a:pPr algn="ctr"/>
             <a:r>
               <a:rPr lang="en-US" dirty="0" smtClean="0"/>
-              <a:t>Entrées et sorties</a:t>
+              <a:t>Regression sur le co</a:t>
+            </a:r>
+            <a:r>
+              <a:rPr lang="fr-FR" dirty="0" err="1" smtClean="0"/>
+              <a:t>ût</a:t>
+            </a:r>
+            <a:r>
+              <a:rPr lang="fr-FR" dirty="0" smtClean="0"/>
+              <a:t>  d’une transaction</a:t>
             </a:r>
             <a:endParaRPr lang="en-US" dirty="0"/>
           </a:p>
         </p:txBody>
       </p:sp>
-      <p:pic>
-        <p:nvPicPr>
-          <p:cNvPr id="8" name="Content Placeholder 7"/>
-          <p:cNvPicPr>
-            <a:picLocks noGrp="1" noChangeAspect="1"/>
-          </p:cNvPicPr>
+      <p:sp>
+        <p:nvSpPr>
+          <p:cNvPr id="3" name="Content Placeholder 2"/>
+          <p:cNvSpPr>
+            <a:spLocks noGrp="1"/>
+          </p:cNvSpPr>
           <p:nvPr>
             <p:ph idx="1"/>
           </p:nvPr>
-        </p:nvPicPr>
-        <p:blipFill>
-          <a:blip r:embed="rId2">
-            <a:extLst>
-              <a:ext uri="{28A0092B-C50C-407E-A947-70E740481C1C}">
-                <a14:useLocalDpi xmlns:a14="http://schemas.microsoft.com/office/drawing/2010/main" val="0"/>
-              </a:ext>
-            </a:extLst>
-          </a:blip>
-          <a:stretch>
-            <a:fillRect/>
-          </a:stretch>
-        </p:blipFill>
-        <p:spPr>
-          <a:xfrm>
-            <a:off x="1485179" y="1614488"/>
-            <a:ext cx="9374042" cy="4252912"/>
-          </a:xfrm>
-        </p:spPr>
-      </p:pic>
-      <p:sp>
-        <p:nvSpPr>
-          <p:cNvPr id="6" name="Rectangle 5"/>
-          <p:cNvSpPr/>
-          <p:nvPr/>
-        </p:nvSpPr>
-        <p:spPr>
-          <a:xfrm>
-            <a:off x="1485178" y="1614489"/>
-            <a:ext cx="8687521" cy="4252912"/>
-          </a:xfrm>
-          <a:prstGeom prst="rect">
-            <a:avLst/>
-          </a:prstGeom>
-          <a:noFill/>
-          <a:ln>
-            <a:solidFill>
-              <a:srgbClr val="00B050"/>
-            </a:solidFill>
-          </a:ln>
-        </p:spPr>
-        <p:style>
-          <a:lnRef idx="2">
-            <a:schemeClr val="accent6"/>
-          </a:lnRef>
-          <a:fillRef idx="1">
-            <a:schemeClr val="lt1"/>
-          </a:fillRef>
-          <a:effectRef idx="0">
-            <a:schemeClr val="accent6"/>
-          </a:effectRef>
-          <a:fontRef idx="minor">
-            <a:schemeClr val="dk1"/>
-          </a:fontRef>
-        </p:style>
-        <p:txBody>
-          <a:bodyPr rtlCol="0" anchor="ctr"/>
-          <a:lstStyle/>
-          <a:p>
-            <a:pPr algn="ctr"/>
-            <a:endParaRPr lang="en-US">
-              <a:solidFill>
-                <a:srgbClr val="00B050"/>
-              </a:solidFill>
-            </a:endParaRPr>
-          </a:p>
-        </p:txBody>
-      </p:sp>
-      <p:sp>
-        <p:nvSpPr>
-          <p:cNvPr id="20" name="TextBox 19"/>
-          <p:cNvSpPr txBox="1"/>
-          <p:nvPr/>
-        </p:nvSpPr>
-        <p:spPr>
-          <a:xfrm>
-            <a:off x="5691155" y="6043611"/>
-            <a:ext cx="962089" cy="369332"/>
-          </a:xfrm>
-          <a:prstGeom prst="rect">
-            <a:avLst/>
-          </a:prstGeom>
-          <a:noFill/>
-        </p:spPr>
-        <p:txBody>
-          <a:bodyPr wrap="square" rtlCol="0">
-            <a:spAutoFit/>
-          </a:bodyPr>
-          <a:lstStyle/>
-          <a:p>
-            <a:r>
-              <a:rPr lang="en-US" b="1" dirty="0" smtClean="0">
-                <a:solidFill>
-                  <a:srgbClr val="00B050"/>
-                </a:solidFill>
-              </a:rPr>
-              <a:t>Entrées</a:t>
-            </a:r>
-            <a:endParaRPr lang="en-US" b="1" dirty="0">
-              <a:solidFill>
-                <a:srgbClr val="00B050"/>
-              </a:solidFill>
-            </a:endParaRPr>
+        </p:nvSpPr>
+        <p:spPr/>
+        <p:txBody>
+          <a:bodyPr/>
+          <a:lstStyle/>
+          <a:p>
+            <a:r>
+              <a:rPr lang="fr-FR" dirty="0" err="1" smtClean="0"/>
+              <a:t>Pré-traitements</a:t>
+            </a:r>
+            <a:endParaRPr lang="fr-FR" dirty="0" smtClean="0"/>
+          </a:p>
+          <a:p>
+            <a:r>
+              <a:rPr lang="fr-FR" dirty="0" smtClean="0"/>
+              <a:t>Encodage</a:t>
+            </a:r>
+          </a:p>
+          <a:p>
+            <a:r>
+              <a:rPr lang="fr-FR" dirty="0" smtClean="0"/>
+              <a:t>Entrainement</a:t>
+            </a:r>
+          </a:p>
+          <a:p>
+            <a:r>
+              <a:rPr lang="fr-FR" dirty="0" smtClean="0"/>
+              <a:t>Mesures de performances</a:t>
+            </a:r>
+            <a:endParaRPr lang="fr-FR" dirty="0"/>
           </a:p>
         </p:txBody>
       </p:sp>
     </p:spTree>
     <p:extLst>
       <p:ext uri="{BB962C8B-B14F-4D97-AF65-F5344CB8AC3E}">
-        <p14:creationId xmlns:p14="http://schemas.microsoft.com/office/powerpoint/2010/main" val="508686376"/>
+        <p14:creationId xmlns:p14="http://schemas.microsoft.com/office/powerpoint/2010/main" val="836097436"/>
       </p:ext>
     </p:extLst>
   </p:cSld>
@@ -8776,8 +8822,8 @@
         </p:nvSpPr>
         <p:spPr>
           <a:xfrm>
-            <a:off x="1485178" y="1614489"/>
-            <a:ext cx="8687521" cy="4252912"/>
+            <a:off x="2185639" y="1614489"/>
+            <a:ext cx="7987060" cy="4252912"/>
           </a:xfrm>
           <a:prstGeom prst="rect">
             <a:avLst/>
@@ -8854,92 +8900,10 @@
           </a:p>
         </p:txBody>
       </p:sp>
-      <p:sp>
-        <p:nvSpPr>
-          <p:cNvPr id="7" name="Rectangle 6"/>
-          <p:cNvSpPr/>
-          <p:nvPr/>
-        </p:nvSpPr>
-        <p:spPr>
-          <a:xfrm>
-            <a:off x="10172698" y="1614487"/>
-            <a:ext cx="735045" cy="4252912"/>
-          </a:xfrm>
-          <a:prstGeom prst="rect">
-            <a:avLst/>
-          </a:prstGeom>
-          <a:noFill/>
-          <a:ln>
-            <a:solidFill>
-              <a:srgbClr val="C00000"/>
-            </a:solidFill>
-          </a:ln>
-        </p:spPr>
-        <p:style>
-          <a:lnRef idx="2">
-            <a:schemeClr val="accent6"/>
-          </a:lnRef>
-          <a:fillRef idx="1">
-            <a:schemeClr val="lt1"/>
-          </a:fillRef>
-          <a:effectRef idx="0">
-            <a:schemeClr val="accent6"/>
-          </a:effectRef>
-          <a:fontRef idx="minor">
-            <a:schemeClr val="dk1"/>
-          </a:fontRef>
-        </p:style>
-        <p:txBody>
-          <a:bodyPr rtlCol="0" anchor="ctr"/>
-          <a:lstStyle/>
-          <a:p>
-            <a:pPr algn="ctr"/>
-            <a:endParaRPr lang="en-US"/>
-          </a:p>
-        </p:txBody>
-      </p:sp>
-      <p:sp>
-        <p:nvSpPr>
-          <p:cNvPr id="9" name="TextBox 8"/>
-          <p:cNvSpPr txBox="1"/>
-          <p:nvPr/>
-        </p:nvSpPr>
-        <p:spPr>
-          <a:xfrm>
-            <a:off x="10058409" y="1096450"/>
-            <a:ext cx="814388" cy="369332"/>
-          </a:xfrm>
-          <a:prstGeom prst="rect">
-            <a:avLst/>
-          </a:prstGeom>
-          <a:noFill/>
-        </p:spPr>
-        <p:txBody>
-          <a:bodyPr wrap="square" rtlCol="0">
-            <a:spAutoFit/>
-          </a:bodyPr>
-          <a:lstStyle/>
-          <a:p>
-            <a:r>
-              <a:rPr lang="en-US" b="1" dirty="0" smtClean="0">
-                <a:solidFill>
-                  <a:srgbClr val="C00000"/>
-                </a:solidFill>
-              </a:rPr>
-              <a:t>Sortie</a:t>
-            </a:r>
-            <a:endParaRPr lang="en-US" b="1" dirty="0">
-              <a:solidFill>
-                <a:srgbClr val="C00000"/>
-              </a:solidFill>
-            </a:endParaRPr>
-          </a:p>
-        </p:txBody>
-      </p:sp>
     </p:spTree>
     <p:extLst>
       <p:ext uri="{BB962C8B-B14F-4D97-AF65-F5344CB8AC3E}">
-        <p14:creationId xmlns:p14="http://schemas.microsoft.com/office/powerpoint/2010/main" val="1952244557"/>
+        <p14:creationId xmlns:p14="http://schemas.microsoft.com/office/powerpoint/2010/main" val="508686376"/>
       </p:ext>
     </p:extLst>
   </p:cSld>
@@ -8978,17 +8942,17 @@
         </p:nvSpPr>
         <p:spPr>
           <a:xfrm>
-            <a:off x="1383475" y="0"/>
-            <a:ext cx="9601200" cy="703613"/>
-          </a:xfrm>
-        </p:spPr>
-        <p:txBody>
-          <a:bodyPr/>
-          <a:lstStyle/>
-          <a:p>
-            <a:r>
-              <a:rPr lang="en-US" smtClean="0"/>
-              <a:t>Pré-traitements</a:t>
+            <a:off x="1371600" y="685800"/>
+            <a:ext cx="9601200" cy="929244"/>
+          </a:xfrm>
+        </p:spPr>
+        <p:txBody>
+          <a:bodyPr/>
+          <a:lstStyle/>
+          <a:p>
+            <a:r>
+              <a:rPr lang="en-US" dirty="0" smtClean="0"/>
+              <a:t>Entrées et sorties</a:t>
             </a:r>
             <a:endParaRPr lang="en-US" dirty="0"/>
           </a:p>
@@ -8996,11 +8960,13 @@
       </p:sp>
       <p:pic>
         <p:nvPicPr>
-          <p:cNvPr id="5" name="Content Placeholder 3"/>
+          <p:cNvPr id="8" name="Content Placeholder 7"/>
           <p:cNvPicPr>
-            <a:picLocks noChangeAspect="1"/>
+            <a:picLocks noGrp="1" noChangeAspect="1"/>
           </p:cNvPicPr>
-          <p:nvPr/>
+          <p:nvPr>
+            <p:ph idx="1"/>
+          </p:nvPr>
         </p:nvPicPr>
         <p:blipFill>
           <a:blip r:embed="rId2">
@@ -9016,18 +8982,183 @@
         </p:blipFill>
         <p:spPr>
           <a:xfrm>
-            <a:off x="1561604" y="703614"/>
-            <a:ext cx="10161687" cy="5876306"/>
+            <a:off x="1485179" y="1614488"/>
+            <a:ext cx="9374042" cy="4252912"/>
+          </a:xfrm>
+        </p:spPr>
+      </p:pic>
+      <p:sp>
+        <p:nvSpPr>
+          <p:cNvPr id="6" name="Rectangle 5"/>
+          <p:cNvSpPr/>
+          <p:nvPr/>
+        </p:nvSpPr>
+        <p:spPr>
+          <a:xfrm>
+            <a:off x="2185639" y="1614489"/>
+            <a:ext cx="7987059" cy="4252912"/>
           </a:xfrm>
           <a:prstGeom prst="rect">
             <a:avLst/>
           </a:prstGeom>
-        </p:spPr>
-      </p:pic>
+          <a:noFill/>
+          <a:ln>
+            <a:solidFill>
+              <a:srgbClr val="00B050"/>
+            </a:solidFill>
+          </a:ln>
+        </p:spPr>
+        <p:style>
+          <a:lnRef idx="2">
+            <a:schemeClr val="accent6"/>
+          </a:lnRef>
+          <a:fillRef idx="1">
+            <a:schemeClr val="lt1"/>
+          </a:fillRef>
+          <a:effectRef idx="0">
+            <a:schemeClr val="accent6"/>
+          </a:effectRef>
+          <a:fontRef idx="minor">
+            <a:schemeClr val="dk1"/>
+          </a:fontRef>
+        </p:style>
+        <p:txBody>
+          <a:bodyPr rtlCol="0" anchor="ctr"/>
+          <a:lstStyle/>
+          <a:p>
+            <a:pPr algn="ctr"/>
+            <a:endParaRPr lang="en-US">
+              <a:solidFill>
+                <a:srgbClr val="00B050"/>
+              </a:solidFill>
+            </a:endParaRPr>
+          </a:p>
+        </p:txBody>
+      </p:sp>
+      <p:sp>
+        <p:nvSpPr>
+          <p:cNvPr id="20" name="TextBox 19"/>
+          <p:cNvSpPr txBox="1"/>
+          <p:nvPr/>
+        </p:nvSpPr>
+        <p:spPr>
+          <a:xfrm>
+            <a:off x="5691155" y="6043611"/>
+            <a:ext cx="962089" cy="369332"/>
+          </a:xfrm>
+          <a:prstGeom prst="rect">
+            <a:avLst/>
+          </a:prstGeom>
+          <a:noFill/>
+        </p:spPr>
+        <p:txBody>
+          <a:bodyPr wrap="square" rtlCol="0">
+            <a:spAutoFit/>
+          </a:bodyPr>
+          <a:lstStyle/>
+          <a:p>
+            <a:r>
+              <a:rPr lang="en-US" b="1" dirty="0" smtClean="0">
+                <a:solidFill>
+                  <a:srgbClr val="00B050"/>
+                </a:solidFill>
+              </a:rPr>
+              <a:t>Entrées</a:t>
+            </a:r>
+            <a:endParaRPr lang="en-US" b="1" dirty="0">
+              <a:solidFill>
+                <a:srgbClr val="00B050"/>
+              </a:solidFill>
+            </a:endParaRPr>
+          </a:p>
+        </p:txBody>
+      </p:sp>
+      <p:sp>
+        <p:nvSpPr>
+          <p:cNvPr id="7" name="Rectangle 6"/>
+          <p:cNvSpPr/>
+          <p:nvPr/>
+        </p:nvSpPr>
+        <p:spPr>
+          <a:xfrm>
+            <a:off x="10172698" y="1614487"/>
+            <a:ext cx="735045" cy="4252912"/>
+          </a:xfrm>
+          <a:prstGeom prst="rect">
+            <a:avLst/>
+          </a:prstGeom>
+          <a:noFill/>
+          <a:ln>
+            <a:solidFill>
+              <a:srgbClr val="C00000"/>
+            </a:solidFill>
+          </a:ln>
+        </p:spPr>
+        <p:style>
+          <a:lnRef idx="2">
+            <a:schemeClr val="accent6"/>
+          </a:lnRef>
+          <a:fillRef idx="1">
+            <a:schemeClr val="lt1"/>
+          </a:fillRef>
+          <a:effectRef idx="0">
+            <a:schemeClr val="accent6"/>
+          </a:effectRef>
+          <a:fontRef idx="minor">
+            <a:schemeClr val="dk1"/>
+          </a:fontRef>
+        </p:style>
+        <p:txBody>
+          <a:bodyPr rtlCol="0" anchor="ctr"/>
+          <a:lstStyle/>
+          <a:p>
+            <a:pPr algn="ctr"/>
+            <a:endParaRPr lang="en-US"/>
+          </a:p>
+        </p:txBody>
+      </p:sp>
+      <p:sp>
+        <p:nvSpPr>
+          <p:cNvPr id="9" name="TextBox 8"/>
+          <p:cNvSpPr txBox="1"/>
+          <p:nvPr/>
+        </p:nvSpPr>
+        <p:spPr>
+          <a:xfrm>
+            <a:off x="10058409" y="1096450"/>
+            <a:ext cx="814388" cy="369332"/>
+          </a:xfrm>
+          <a:prstGeom prst="rect">
+            <a:avLst/>
+          </a:prstGeom>
+          <a:noFill/>
+        </p:spPr>
+        <p:txBody>
+          <a:bodyPr wrap="square" rtlCol="0">
+            <a:spAutoFit/>
+          </a:bodyPr>
+          <a:lstStyle/>
+          <a:p>
+            <a:r>
+              <a:rPr lang="en-US" b="1" dirty="0" smtClean="0">
+                <a:solidFill>
+                  <a:srgbClr val="C00000"/>
+                </a:solidFill>
+              </a:rPr>
+              <a:t>Sortie</a:t>
+            </a:r>
+            <a:endParaRPr lang="en-US" b="1" dirty="0">
+              <a:solidFill>
+                <a:srgbClr val="C00000"/>
+              </a:solidFill>
+            </a:endParaRPr>
+          </a:p>
+        </p:txBody>
+      </p:sp>
     </p:spTree>
     <p:extLst>
       <p:ext uri="{BB962C8B-B14F-4D97-AF65-F5344CB8AC3E}">
-        <p14:creationId xmlns:p14="http://schemas.microsoft.com/office/powerpoint/2010/main" val="1041887733"/>
+        <p14:creationId xmlns:p14="http://schemas.microsoft.com/office/powerpoint/2010/main" val="1952244557"/>
       </p:ext>
     </p:extLst>
   </p:cSld>
@@ -9066,8 +9197,8 @@
         </p:nvSpPr>
         <p:spPr>
           <a:xfrm>
-            <a:off x="1371600" y="685800"/>
-            <a:ext cx="9601200" cy="881743"/>
+            <a:off x="1383475" y="0"/>
+            <a:ext cx="9601200" cy="703613"/>
           </a:xfrm>
         </p:spPr>
         <p:txBody>
@@ -9076,16 +9207,46 @@
           <a:p>
             <a:r>
               <a:rPr lang="en-US" smtClean="0"/>
-              <a:t>Encodage</a:t>
+              <a:t>Pré-traitements</a:t>
             </a:r>
             <a:endParaRPr lang="en-US" dirty="0"/>
           </a:p>
         </p:txBody>
       </p:sp>
+      <p:pic>
+        <p:nvPicPr>
+          <p:cNvPr id="5" name="Content Placeholder 3"/>
+          <p:cNvPicPr>
+            <a:picLocks noChangeAspect="1"/>
+          </p:cNvPicPr>
+          <p:nvPr/>
+        </p:nvPicPr>
+        <p:blipFill>
+          <a:blip r:embed="rId2">
+            <a:extLst>
+              <a:ext uri="{28A0092B-C50C-407E-A947-70E740481C1C}">
+                <a14:useLocalDpi xmlns:a14="http://schemas.microsoft.com/office/drawing/2010/main" val="0"/>
+              </a:ext>
+            </a:extLst>
+          </a:blip>
+          <a:stretch>
+            <a:fillRect/>
+          </a:stretch>
+        </p:blipFill>
+        <p:spPr>
+          <a:xfrm>
+            <a:off x="1561604" y="703614"/>
+            <a:ext cx="10161687" cy="5876306"/>
+          </a:xfrm>
+          <a:prstGeom prst="rect">
+            <a:avLst/>
+          </a:prstGeom>
+        </p:spPr>
+      </p:pic>
     </p:spTree>
     <p:extLst>
       <p:ext uri="{BB962C8B-B14F-4D97-AF65-F5344CB8AC3E}">
-        <p14:creationId xmlns:p14="http://schemas.microsoft.com/office/powerpoint/2010/main" val="1343685681"/>
+        <p14:creationId xmlns:p14="http://schemas.microsoft.com/office/powerpoint/2010/main" val="1041887733"/>
       </p:ext>
     </p:extLst>
   </p:cSld>
@@ -9140,38 +9301,10 @@
           </a:p>
         </p:txBody>
       </p:sp>
-      <p:pic>
-        <p:nvPicPr>
-          <p:cNvPr id="4" name="Content Placeholder 3"/>
-          <p:cNvPicPr>
-            <a:picLocks noGrp="1" noChangeAspect="1"/>
-          </p:cNvPicPr>
-          <p:nvPr>
-            <p:ph idx="1"/>
-          </p:nvPr>
-        </p:nvPicPr>
-        <p:blipFill rotWithShape="1">
-          <a:blip r:embed="rId2">
-            <a:extLst>
-              <a:ext uri="{28A0092B-C50C-407E-A947-70E740481C1C}">
-                <a14:useLocalDpi xmlns:a14="http://schemas.microsoft.com/office/drawing/2010/main" val="0"/>
-              </a:ext>
-            </a:extLst>
-          </a:blip>
-          <a:srcRect b="4246"/>
-          <a:stretch/>
-        </p:blipFill>
-        <p:spPr>
-          <a:xfrm>
-            <a:off x="3707821" y="1567543"/>
-            <a:ext cx="5875565" cy="4658419"/>
-          </a:xfrm>
-        </p:spPr>
-      </p:pic>
     </p:spTree>
     <p:extLst>
       <p:ext uri="{BB962C8B-B14F-4D97-AF65-F5344CB8AC3E}">
-        <p14:creationId xmlns:p14="http://schemas.microsoft.com/office/powerpoint/2010/main" val="1100938262"/>
+        <p14:creationId xmlns:p14="http://schemas.microsoft.com/office/powerpoint/2010/main" val="1343685681"/>
       </p:ext>
     </p:extLst>
   </p:cSld>
@@ -9208,64 +9341,35 @@
             <p:ph type="title"/>
           </p:nvPr>
         </p:nvSpPr>
-        <p:spPr/>
-        <p:txBody>
-          <a:bodyPr/>
-          <a:lstStyle/>
-          <a:p>
-            <a:r>
-              <a:rPr lang="en-US" dirty="0" err="1" smtClean="0"/>
-              <a:t>Régression</a:t>
-            </a:r>
-            <a:r>
-              <a:rPr lang="en-US" dirty="0" smtClean="0"/>
-              <a:t> </a:t>
-            </a:r>
-            <a:r>
-              <a:rPr lang="en-US" dirty="0" err="1" smtClean="0"/>
-              <a:t>linéaire</a:t>
+        <p:spPr>
+          <a:xfrm>
+            <a:off x="1371600" y="685800"/>
+            <a:ext cx="9601200" cy="881743"/>
+          </a:xfrm>
+        </p:spPr>
+        <p:txBody>
+          <a:bodyPr/>
+          <a:lstStyle/>
+          <a:p>
+            <a:r>
+              <a:rPr lang="en-US" smtClean="0"/>
+              <a:t>Encodage</a:t>
             </a:r>
             <a:endParaRPr lang="en-US" dirty="0"/>
-          </a:p>
-        </p:txBody>
-      </p:sp>
-      <p:sp>
-        <p:nvSpPr>
-          <p:cNvPr id="3" name="Content Placeholder 2"/>
-          <p:cNvSpPr>
-            <a:spLocks noGrp="1"/>
-          </p:cNvSpPr>
-          <p:nvPr>
-            <p:ph idx="1"/>
-          </p:nvPr>
-        </p:nvSpPr>
-        <p:spPr>
-          <a:xfrm>
-            <a:off x="1371600" y="1781299"/>
-            <a:ext cx="9601200" cy="4086101"/>
-          </a:xfrm>
-        </p:spPr>
-        <p:txBody>
-          <a:bodyPr/>
-          <a:lstStyle/>
-          <a:p>
-            <a:r>
-              <a:rPr lang="en-US" smtClean="0"/>
-              <a:t>Score : 0.6%</a:t>
-            </a:r>
-            <a:endParaRPr lang="en-US"/>
           </a:p>
         </p:txBody>
       </p:sp>
       <p:pic>
         <p:nvPicPr>
-          <p:cNvPr id="4" name="Picture 3"/>
+          <p:cNvPr id="4" name="Content Placeholder 3"/>
           <p:cNvPicPr>
-            <a:picLocks noChangeAspect="1"/>
+            <a:picLocks noGrp="1" noChangeAspect="1"/>
           </p:cNvPicPr>
-          <p:nvPr/>
+          <p:nvPr>
+            <p:ph idx="1"/>
+          </p:nvPr>
         </p:nvPicPr>
-        <p:blipFill>
+        <p:blipFill rotWithShape="1">
           <a:blip r:embed="rId2">
             <a:extLst>
               <a:ext uri="{28A0092B-C50C-407E-A947-70E740481C1C}">
@@ -9273,24 +9377,20 @@
               </a:ext>
             </a:extLst>
           </a:blip>
-          <a:stretch>
-            <a:fillRect/>
-          </a:stretch>
+          <a:srcRect b="4246"/>
+          <a:stretch/>
         </p:blipFill>
         <p:spPr>
           <a:xfrm>
-            <a:off x="4341256" y="1601849"/>
-            <a:ext cx="5765800" cy="4445000"/>
-          </a:xfrm>
-          <a:prstGeom prst="rect">
-            <a:avLst/>
-          </a:prstGeom>
+            <a:off x="3707821" y="1567543"/>
+            <a:ext cx="5875565" cy="4658419"/>
+          </a:xfrm>
         </p:spPr>
       </p:pic>
     </p:spTree>
     <p:extLst>
       <p:ext uri="{BB962C8B-B14F-4D97-AF65-F5344CB8AC3E}">
-        <p14:creationId xmlns:p14="http://schemas.microsoft.com/office/powerpoint/2010/main" val="1121263809"/>
+        <p14:creationId xmlns:p14="http://schemas.microsoft.com/office/powerpoint/2010/main" val="1100938262"/>
       </p:ext>
     </p:extLst>
   </p:cSld>
@@ -9333,10 +9433,18 @@
           <a:lstStyle/>
           <a:p>
             <a:r>
-              <a:rPr lang="fr-FR" dirty="0" smtClean="0"/>
-              <a:t>Régression par arbre de décision</a:t>
-            </a:r>
-            <a:endParaRPr lang="fr-FR" dirty="0"/>
+              <a:rPr lang="en-US" dirty="0" err="1" smtClean="0"/>
+              <a:t>Régression</a:t>
+            </a:r>
+            <a:r>
+              <a:rPr lang="en-US" dirty="0" smtClean="0"/>
+              <a:t> </a:t>
+            </a:r>
+            <a:r>
+              <a:rPr lang="en-US" dirty="0" err="1" smtClean="0"/>
+              <a:t>linéaire</a:t>
+            </a:r>
+            <a:endParaRPr lang="en-US" dirty="0"/>
           </a:p>
         </p:txBody>
       </p:sp>
@@ -9350,46 +9458,58 @@
             <p:ph idx="1"/>
           </p:nvPr>
         </p:nvSpPr>
-        <p:spPr/>
-        <p:txBody>
-          <a:bodyPr/>
-          <a:lstStyle/>
-          <a:p>
-            <a:r>
-              <a:rPr lang="fr-FR" dirty="0" smtClean="0"/>
-              <a:t>Pas de limitation sur la profondeur de l’arbre :</a:t>
-            </a:r>
-          </a:p>
-          <a:p>
-            <a:pPr lvl="1"/>
-            <a:r>
-              <a:rPr lang="fr-FR" dirty="0" smtClean="0"/>
-              <a:t>Score : 43%</a:t>
-            </a:r>
-          </a:p>
-          <a:p>
-            <a:endParaRPr lang="fr-FR" dirty="0" smtClean="0"/>
-          </a:p>
-          <a:p>
-            <a:r>
-              <a:rPr lang="fr-FR" dirty="0" smtClean="0"/>
-              <a:t>Après limitation de la profondeur à 13 :</a:t>
-            </a:r>
-          </a:p>
-          <a:p>
-            <a:pPr lvl="1"/>
-            <a:r>
-              <a:rPr lang="fr-FR" dirty="0" smtClean="0"/>
-              <a:t>Score : 68%</a:t>
-            </a:r>
-            <a:endParaRPr lang="fr-FR" dirty="0"/>
-          </a:p>
-        </p:txBody>
-      </p:sp>
+        <p:spPr>
+          <a:xfrm>
+            <a:off x="1371600" y="1781299"/>
+            <a:ext cx="9601200" cy="4086101"/>
+          </a:xfrm>
+        </p:spPr>
+        <p:txBody>
+          <a:bodyPr/>
+          <a:lstStyle/>
+          <a:p>
+            <a:r>
+              <a:rPr lang="en-US" smtClean="0"/>
+              <a:t>Score : 0.6%</a:t>
+            </a:r>
+            <a:endParaRPr lang="en-US"/>
+          </a:p>
+        </p:txBody>
+      </p:sp>
+      <p:pic>
+        <p:nvPicPr>
+          <p:cNvPr id="4" name="Picture 3"/>
+          <p:cNvPicPr>
+            <a:picLocks noChangeAspect="1"/>
+          </p:cNvPicPr>
+          <p:nvPr/>
+        </p:nvPicPr>
+        <p:blipFill>
+          <a:blip r:embed="rId2">
+            <a:extLst>
+              <a:ext uri="{28A0092B-C50C-407E-A947-70E740481C1C}">
+                <a14:useLocalDpi xmlns:a14="http://schemas.microsoft.com/office/drawing/2010/main" val="0"/>
+              </a:ext>
+            </a:extLst>
+          </a:blip>
+          <a:stretch>
+            <a:fillRect/>
+          </a:stretch>
+        </p:blipFill>
+        <p:spPr>
+          <a:xfrm>
+            <a:off x="4341256" y="1601849"/>
+            <a:ext cx="5765800" cy="4445000"/>
+          </a:xfrm>
+          <a:prstGeom prst="rect">
+            <a:avLst/>
+          </a:prstGeom>
+        </p:spPr>
+      </p:pic>
     </p:spTree>
     <p:extLst>
       <p:ext uri="{BB962C8B-B14F-4D97-AF65-F5344CB8AC3E}">
-        <p14:creationId xmlns:p14="http://schemas.microsoft.com/office/powerpoint/2010/main" val="203820399"/>
+        <p14:creationId xmlns:p14="http://schemas.microsoft.com/office/powerpoint/2010/main" val="1121263809"/>
       </p:ext>
     </p:extLst>
   </p:cSld>
@@ -9432,26 +9552,10 @@
           <a:lstStyle/>
           <a:p>
             <a:r>
-              <a:rPr lang="en-US" dirty="0" err="1"/>
-              <a:t>Régression</a:t>
-            </a:r>
-            <a:r>
-              <a:rPr lang="en-US" dirty="0"/>
-              <a:t> par </a:t>
-            </a:r>
-            <a:r>
-              <a:rPr lang="en-US" dirty="0" smtClean="0"/>
-              <a:t>for</a:t>
-            </a:r>
-            <a:r>
-              <a:rPr lang="fr-FR" dirty="0" err="1" smtClean="0"/>
-              <a:t>êt</a:t>
-            </a:r>
-            <a:r>
-              <a:rPr lang="fr-FR" dirty="0" smtClean="0"/>
-              <a:t> aléatoire</a:t>
-            </a:r>
-            <a:endParaRPr lang="en-US" dirty="0"/>
+              <a:rPr lang="fr-FR" dirty="0" smtClean="0"/>
+              <a:t>Régression par arbre de décision</a:t>
+            </a:r>
+            <a:endParaRPr lang="fr-FR" dirty="0"/>
           </a:p>
         </p:txBody>
       </p:sp>
@@ -9471,124 +9575,40 @@
           <a:lstStyle/>
           <a:p>
             <a:r>
-              <a:rPr lang="en-US" dirty="0"/>
-              <a:t>Pas de limitation sur la </a:t>
-            </a:r>
-            <a:r>
-              <a:rPr lang="en-US" dirty="0" err="1"/>
-              <a:t>profondeur</a:t>
-            </a:r>
-            <a:r>
-              <a:rPr lang="en-US" dirty="0"/>
-              <a:t> de </a:t>
-            </a:r>
-            <a:r>
-              <a:rPr lang="en-US" dirty="0" err="1"/>
-              <a:t>l’arbre</a:t>
-            </a:r>
-            <a:r>
-              <a:rPr lang="en-US" dirty="0"/>
-              <a:t> :</a:t>
+              <a:rPr lang="fr-FR" dirty="0" smtClean="0"/>
+              <a:t>Pas de limitation sur la profondeur de l’arbre :</a:t>
             </a:r>
           </a:p>
           <a:p>
             <a:pPr lvl="1"/>
             <a:r>
-              <a:rPr lang="en-US" dirty="0"/>
+              <a:rPr lang="fr-FR" dirty="0" smtClean="0"/>
               <a:t>Score : 43%</a:t>
             </a:r>
           </a:p>
           <a:p>
-            <a:r>
-              <a:rPr lang="en-US" dirty="0" smtClean="0"/>
-              <a:t>Après </a:t>
-            </a:r>
-            <a:r>
-              <a:rPr lang="en-US" dirty="0"/>
-              <a:t>limitation de la </a:t>
-            </a:r>
-            <a:r>
-              <a:rPr lang="en-US" dirty="0" err="1"/>
-              <a:t>profondeur</a:t>
-            </a:r>
-            <a:r>
-              <a:rPr lang="en-US" dirty="0"/>
-              <a:t> </a:t>
-            </a:r>
-            <a:r>
-              <a:rPr lang="en-US" dirty="0" err="1"/>
-              <a:t>à</a:t>
-            </a:r>
-            <a:r>
-              <a:rPr lang="en-US" dirty="0"/>
-              <a:t> 13 :</a:t>
+            <a:endParaRPr lang="fr-FR" dirty="0" smtClean="0"/>
+          </a:p>
+          <a:p>
+            <a:r>
+              <a:rPr lang="fr-FR" dirty="0" smtClean="0"/>
+              <a:t>Après limitation de la profondeur à 13 :</a:t>
             </a:r>
           </a:p>
           <a:p>
             <a:pPr lvl="1"/>
             <a:r>
-              <a:rPr lang="en-US" dirty="0"/>
-              <a:t>Score : </a:t>
-            </a:r>
-            <a:r>
-              <a:rPr lang="en-US" dirty="0" smtClean="0"/>
-              <a:t>70%</a:t>
-            </a:r>
-          </a:p>
-          <a:p>
-            <a:pPr marL="0" indent="0">
-              <a:buNone/>
-            </a:pPr>
-            <a:endParaRPr lang="en-US" dirty="0" smtClean="0"/>
-          </a:p>
-          <a:p>
-            <a:pPr marL="0" indent="0">
-              <a:buNone/>
-            </a:pPr>
-            <a:endParaRPr lang="en-US" dirty="0" smtClean="0"/>
-          </a:p>
-          <a:p>
-            <a:pPr marL="0" indent="0">
-              <a:buNone/>
-            </a:pPr>
-            <a:endParaRPr lang="en-US" dirty="0"/>
-          </a:p>
-          <a:p>
-            <a:pPr marL="0" indent="0">
-              <a:buNone/>
-            </a:pPr>
-            <a:r>
-              <a:rPr lang="en-US" b="1" dirty="0" smtClean="0"/>
-              <a:t>*</a:t>
-            </a:r>
-            <a:r>
-              <a:rPr lang="en-US" b="1" dirty="0" err="1"/>
-              <a:t>Nombre</a:t>
-            </a:r>
-            <a:r>
-              <a:rPr lang="en-US" b="1" dirty="0"/>
-              <a:t> </a:t>
-            </a:r>
-            <a:r>
-              <a:rPr lang="en-US" b="1" dirty="0" err="1"/>
-              <a:t>d’arbres</a:t>
-            </a:r>
-            <a:r>
-              <a:rPr lang="en-US" b="1" dirty="0"/>
-              <a:t> = </a:t>
-            </a:r>
-            <a:r>
-              <a:rPr lang="en-US" b="1" dirty="0" smtClean="0"/>
-              <a:t>200</a:t>
-            </a:r>
-            <a:endParaRPr lang="en-US" b="1" dirty="0"/>
+              <a:rPr lang="fr-FR" dirty="0" smtClean="0"/>
+              <a:t>Score : 68%</a:t>
+            </a:r>
+            <a:endParaRPr lang="fr-FR" dirty="0"/>
           </a:p>
         </p:txBody>
       </p:sp>
     </p:spTree>
     <p:extLst>
       <p:ext uri="{BB962C8B-B14F-4D97-AF65-F5344CB8AC3E}">
-        <p14:creationId xmlns:p14="http://schemas.microsoft.com/office/powerpoint/2010/main" val="1193749196"/>
+        <p14:creationId xmlns:p14="http://schemas.microsoft.com/office/powerpoint/2010/main" val="203820399"/>
       </p:ext>
     </p:extLst>
   </p:cSld>
@@ -9625,25 +9645,16 @@
             <p:ph type="title"/>
           </p:nvPr>
         </p:nvSpPr>
-        <p:spPr>
-          <a:xfrm>
-            <a:off x="1371600" y="685800"/>
-            <a:ext cx="9601200" cy="880241"/>
-          </a:xfrm>
-        </p:spPr>
-        <p:txBody>
-          <a:bodyPr/>
-          <a:lstStyle/>
-          <a:p>
-            <a:r>
-              <a:rPr lang="en-US" dirty="0" smtClean="0"/>
-              <a:t>Conclusions </a:t>
-            </a:r>
-            <a:r>
-              <a:rPr lang="en-US" smtClean="0"/>
-              <a:t>et perspectives</a:t>
-            </a:r>
-            <a:endParaRPr lang="en-US"/>
+        <p:spPr/>
+        <p:txBody>
+          <a:bodyPr/>
+          <a:lstStyle/>
+          <a:p>
+            <a:r>
+              <a:rPr lang="fr-FR" dirty="0" smtClean="0"/>
+              <a:t>Régression par forêt aléatoire</a:t>
+            </a:r>
+            <a:endParaRPr lang="fr-FR" dirty="0"/>
           </a:p>
         </p:txBody>
       </p:sp>
@@ -9657,67 +9668,69 @@
             <p:ph idx="1"/>
           </p:nvPr>
         </p:nvSpPr>
-        <p:spPr>
-          <a:xfrm>
-            <a:off x="1371600" y="1566041"/>
-            <a:ext cx="9601200" cy="4301359"/>
-          </a:xfrm>
-        </p:spPr>
-        <p:txBody>
-          <a:bodyPr/>
-          <a:lstStyle/>
-          <a:p>
-            <a:r>
-              <a:rPr lang="fr-FR" dirty="0" smtClean="0">
-                <a:solidFill>
-                  <a:schemeClr val="accent2">
-                    <a:lumMod val="75000"/>
-                  </a:schemeClr>
-                </a:solidFill>
-              </a:rPr>
-              <a:t>SVM et la régression linéaire ont donnés de mauvais résultats</a:t>
-            </a:r>
-            <a:r>
-              <a:rPr lang="mr-IN" dirty="0" smtClean="0">
-                <a:solidFill>
-                  <a:schemeClr val="accent2">
-                    <a:lumMod val="75000"/>
-                  </a:schemeClr>
-                </a:solidFill>
-              </a:rPr>
-              <a:t>…</a:t>
-            </a:r>
-            <a:r>
-              <a:rPr lang="fr-FR" dirty="0" smtClean="0">
-                <a:solidFill>
-                  <a:schemeClr val="accent2">
-                    <a:lumMod val="75000"/>
-                  </a:schemeClr>
-                </a:solidFill>
-              </a:rPr>
-              <a:t> Pourquoi ?!</a:t>
-            </a:r>
-          </a:p>
-          <a:p>
-            <a:endParaRPr lang="fr-FR" dirty="0">
-              <a:solidFill>
-                <a:srgbClr val="00B050"/>
-              </a:solidFill>
-            </a:endParaRPr>
-          </a:p>
-          <a:p>
-            <a:endParaRPr lang="fr-FR" dirty="0">
-              <a:solidFill>
-                <a:srgbClr val="00B050"/>
-              </a:solidFill>
-            </a:endParaRPr>
+        <p:spPr/>
+        <p:txBody>
+          <a:bodyPr>
+            <a:normAutofit/>
+          </a:bodyPr>
+          <a:lstStyle/>
+          <a:p>
+            <a:r>
+              <a:rPr lang="fr-FR" dirty="0" smtClean="0"/>
+              <a:t>Pas de limitation sur la profondeur de l’arbre :</a:t>
+            </a:r>
+          </a:p>
+          <a:p>
+            <a:pPr lvl="1"/>
+            <a:r>
+              <a:rPr lang="fr-FR" dirty="0" smtClean="0"/>
+              <a:t>Score : 43%</a:t>
+            </a:r>
+          </a:p>
+          <a:p>
+            <a:endParaRPr lang="fr-FR" dirty="0" smtClean="0"/>
+          </a:p>
+          <a:p>
+            <a:r>
+              <a:rPr lang="fr-FR" dirty="0" smtClean="0"/>
+              <a:t>Après limitation de la profondeur à 13 :</a:t>
+            </a:r>
+          </a:p>
+          <a:p>
+            <a:pPr lvl="1"/>
+            <a:r>
+              <a:rPr lang="fr-FR" dirty="0" smtClean="0"/>
+              <a:t>Score : 70%</a:t>
+            </a:r>
+          </a:p>
+          <a:p>
+            <a:pPr marL="0" indent="0">
+              <a:buNone/>
+            </a:pPr>
+            <a:endParaRPr lang="fr-FR" dirty="0" smtClean="0"/>
+          </a:p>
+          <a:p>
+            <a:pPr marL="0" indent="0">
+              <a:buNone/>
+            </a:pPr>
+            <a:endParaRPr lang="fr-FR" dirty="0" smtClean="0"/>
+          </a:p>
+          <a:p>
+            <a:pPr marL="0" indent="0">
+              <a:buNone/>
+            </a:pPr>
+            <a:r>
+              <a:rPr lang="fr-FR" b="1" dirty="0" smtClean="0"/>
+              <a:t>*Nombre d’arbres = 200</a:t>
+            </a:r>
+            <a:endParaRPr lang="fr-FR" b="1" dirty="0"/>
           </a:p>
         </p:txBody>
       </p:sp>
     </p:spTree>
     <p:extLst>
       <p:ext uri="{BB962C8B-B14F-4D97-AF65-F5344CB8AC3E}">
-        <p14:creationId xmlns:p14="http://schemas.microsoft.com/office/powerpoint/2010/main" val="1936047654"/>
+        <p14:creationId xmlns:p14="http://schemas.microsoft.com/office/powerpoint/2010/main" val="1193749196"/>
       </p:ext>
     </p:extLst>
   </p:cSld>
@@ -9828,28 +9841,25 @@
             </a:r>
           </a:p>
           <a:p>
-            <a:r>
-              <a:rPr lang="fr-FR" dirty="0" smtClean="0">
-                <a:solidFill>
-                  <a:srgbClr val="00B050"/>
-                </a:solidFill>
-              </a:rPr>
-              <a:t>Continuer à chercher les bons paramètres des modèles pour de meilleurs résultats</a:t>
-            </a:r>
-          </a:p>
-          <a:p>
             <a:endParaRPr lang="fr-FR" dirty="0">
               <a:solidFill>
                 <a:srgbClr val="00B050"/>
               </a:solidFill>
             </a:endParaRPr>
           </a:p>
+          <a:p>
+            <a:endParaRPr lang="fr-FR" dirty="0">
+              <a:solidFill>
+                <a:srgbClr val="00B050"/>
+              </a:solidFill>
+            </a:endParaRPr>
+          </a:p>
         </p:txBody>
       </p:sp>
     </p:spTree>
     <p:extLst>
       <p:ext uri="{BB962C8B-B14F-4D97-AF65-F5344CB8AC3E}">
-        <p14:creationId xmlns:p14="http://schemas.microsoft.com/office/powerpoint/2010/main" val="276988006"/>
+        <p14:creationId xmlns:p14="http://schemas.microsoft.com/office/powerpoint/2010/main" val="1936047654"/>
       </p:ext>
     </p:extLst>
   </p:cSld>
@@ -9970,18 +9980,6 @@
             </a:r>
           </a:p>
           <a:p>
-            <a:r>
-              <a:rPr lang="fr-FR" dirty="0" smtClean="0">
-                <a:solidFill>
-                  <a:schemeClr val="accent2">
-                    <a:lumMod val="75000"/>
-                  </a:schemeClr>
-                </a:solidFill>
-              </a:rPr>
-              <a:t>Certaines catégories n’ont pas beaucoup d’instances</a:t>
-            </a:r>
-          </a:p>
-          <a:p>
             <a:endParaRPr lang="fr-FR" dirty="0">
               <a:solidFill>
                 <a:srgbClr val="00B050"/>
@@ -9993,7 +9991,7 @@
     </p:spTree>
     <p:extLst>
       <p:ext uri="{BB962C8B-B14F-4D97-AF65-F5344CB8AC3E}">
-        <p14:creationId xmlns:p14="http://schemas.microsoft.com/office/powerpoint/2010/main" val="1478505465"/>
+        <p14:creationId xmlns:p14="http://schemas.microsoft.com/office/powerpoint/2010/main" val="276988006"/>
       </p:ext>
     </p:extLst>
   </p:cSld>
@@ -10228,6 +10226,150 @@
             </a:r>
           </a:p>
           <a:p>
+            <a:endParaRPr lang="fr-FR" dirty="0">
+              <a:solidFill>
+                <a:srgbClr val="00B050"/>
+              </a:solidFill>
+            </a:endParaRPr>
+          </a:p>
+        </p:txBody>
+      </p:sp>
+    </p:spTree>
+    <p:extLst>
+      <p:ext uri="{BB962C8B-B14F-4D97-AF65-F5344CB8AC3E}">
+        <p14:creationId xmlns:p14="http://schemas.microsoft.com/office/powerpoint/2010/main" val="1478505465"/>
+      </p:ext>
+    </p:extLst>
+  </p:cSld>
+  <p:clrMapOvr>
+    <a:masterClrMapping/>
+  </p:clrMapOvr>
+</p:sld>
+</file>
+
+<file path=ppt/slides/slide51.xml><?xml version="1.0" encoding="utf-8"?>
+<p:sld xmlns:a="http://schemas.openxmlformats.org/drawingml/2006/main" xmlns:r="http://schemas.openxmlformats.org/officeDocument/2006/relationships" xmlns:p="http://schemas.openxmlformats.org/presentationml/2006/main">
+  <p:cSld>
+    <p:spTree>
+      <p:nvGrpSpPr>
+        <p:cNvPr id="1" name=""/>
+        <p:cNvGrpSpPr/>
+        <p:nvPr/>
+      </p:nvGrpSpPr>
+      <p:grpSpPr>
+        <a:xfrm>
+          <a:off x="0" y="0"/>
+          <a:ext cx="0" cy="0"/>
+          <a:chOff x="0" y="0"/>
+          <a:chExt cx="0" cy="0"/>
+        </a:xfrm>
+      </p:grpSpPr>
+      <p:sp>
+        <p:nvSpPr>
+          <p:cNvPr id="2" name="Title 1"/>
+          <p:cNvSpPr>
+            <a:spLocks noGrp="1"/>
+          </p:cNvSpPr>
+          <p:nvPr>
+            <p:ph type="title"/>
+          </p:nvPr>
+        </p:nvSpPr>
+        <p:spPr>
+          <a:xfrm>
+            <a:off x="1371600" y="685800"/>
+            <a:ext cx="9601200" cy="880241"/>
+          </a:xfrm>
+        </p:spPr>
+        <p:txBody>
+          <a:bodyPr/>
+          <a:lstStyle/>
+          <a:p>
+            <a:r>
+              <a:rPr lang="en-US" dirty="0" smtClean="0"/>
+              <a:t>Conclusions </a:t>
+            </a:r>
+            <a:r>
+              <a:rPr lang="en-US" smtClean="0"/>
+              <a:t>et perspectives</a:t>
+            </a:r>
+            <a:endParaRPr lang="en-US"/>
+          </a:p>
+        </p:txBody>
+      </p:sp>
+      <p:sp>
+        <p:nvSpPr>
+          <p:cNvPr id="3" name="Content Placeholder 2"/>
+          <p:cNvSpPr>
+            <a:spLocks noGrp="1"/>
+          </p:cNvSpPr>
+          <p:nvPr>
+            <p:ph idx="1"/>
+          </p:nvPr>
+        </p:nvSpPr>
+        <p:spPr>
+          <a:xfrm>
+            <a:off x="1371600" y="1566041"/>
+            <a:ext cx="9601200" cy="4301359"/>
+          </a:xfrm>
+        </p:spPr>
+        <p:txBody>
+          <a:bodyPr/>
+          <a:lstStyle/>
+          <a:p>
+            <a:r>
+              <a:rPr lang="fr-FR" dirty="0" smtClean="0">
+                <a:solidFill>
+                  <a:schemeClr val="accent2">
+                    <a:lumMod val="75000"/>
+                  </a:schemeClr>
+                </a:solidFill>
+              </a:rPr>
+              <a:t>SVM et la régression linéaire ont donnés de mauvais résultats</a:t>
+            </a:r>
+            <a:r>
+              <a:rPr lang="mr-IN" dirty="0" smtClean="0">
+                <a:solidFill>
+                  <a:schemeClr val="accent2">
+                    <a:lumMod val="75000"/>
+                  </a:schemeClr>
+                </a:solidFill>
+              </a:rPr>
+              <a:t>…</a:t>
+            </a:r>
+            <a:r>
+              <a:rPr lang="fr-FR" dirty="0" smtClean="0">
+                <a:solidFill>
+                  <a:schemeClr val="accent2">
+                    <a:lumMod val="75000"/>
+                  </a:schemeClr>
+                </a:solidFill>
+              </a:rPr>
+              <a:t> Pourquoi ?!</a:t>
+            </a:r>
+          </a:p>
+          <a:p>
+            <a:r>
+              <a:rPr lang="fr-FR" dirty="0" smtClean="0">
+                <a:solidFill>
+                  <a:srgbClr val="00B050"/>
+                </a:solidFill>
+              </a:rPr>
+              <a:t>Continuer à chercher les bons paramètres des modèles pour de meilleurs résultats</a:t>
+            </a:r>
+          </a:p>
+          <a:p>
+            <a:r>
+              <a:rPr lang="fr-FR" dirty="0" smtClean="0">
+                <a:solidFill>
+                  <a:schemeClr val="accent2">
+                    <a:lumMod val="75000"/>
+                  </a:schemeClr>
+                </a:solidFill>
+              </a:rPr>
+              <a:t>Certaines catégories n’ont pas beaucoup d’instances</a:t>
+            </a:r>
+          </a:p>
+          <a:p>
             <a:r>
               <a:rPr lang="fr-FR" dirty="0" smtClean="0">
                 <a:solidFill>
@@ -10259,7 +10401,7 @@
 </p:sld>
 </file>
 
-<file path=ppt/slides/slide51.xml><?xml version="1.0" encoding="utf-8"?>
+<file path=ppt/slides/slide52.xml><?xml version="1.0" encoding="utf-8"?>
 <p:sld xmlns:a="http://schemas.openxmlformats.org/drawingml/2006/main" xmlns:r="http://schemas.openxmlformats.org/officeDocument/2006/relationships" xmlns:p="http://schemas.openxmlformats.org/presentationml/2006/main">
   <p:cSld>
     <p:spTree>
@@ -11076,7 +11218,7 @@
                     <a:lstStyle/>
                     <a:p>
                       <a:r>
-                        <a:rPr lang="en-US" smtClean="0"/>
+                        <a:rPr lang="en-US" dirty="0" err="1" smtClean="0"/>
                         <a:t>Caractère</a:t>
                       </a:r>
                       <a:endParaRPr lang="en-US" dirty="0"/>

</xml_diff>